<commit_message>
Cambios en ppt y algo del proyecto de katas
</commit_message>
<xml_diff>
--- a/Documentacion/jasmine.pptx
+++ b/Documentacion/jasmine.pptx
@@ -11,23 +11,27 @@
     <p:sldMasterId id="2147483661" r:id="rId10"/>
   </p:sldMasterIdLst>
   <p:notesMasterIdLst>
-    <p:notesMasterId r:id="rId22"/>
+    <p:notesMasterId r:id="rId26"/>
   </p:notesMasterIdLst>
   <p:handoutMasterIdLst>
-    <p:handoutMasterId r:id="rId23"/>
+    <p:handoutMasterId r:id="rId27"/>
   </p:handoutMasterIdLst>
   <p:sldIdLst>
     <p:sldId id="256" r:id="rId11"/>
     <p:sldId id="360" r:id="rId12"/>
-    <p:sldId id="361" r:id="rId13"/>
-    <p:sldId id="362" r:id="rId14"/>
-    <p:sldId id="363" r:id="rId15"/>
-    <p:sldId id="364" r:id="rId16"/>
-    <p:sldId id="365" r:id="rId17"/>
-    <p:sldId id="366" r:id="rId18"/>
-    <p:sldId id="367" r:id="rId19"/>
-    <p:sldId id="368" r:id="rId20"/>
-    <p:sldId id="265" r:id="rId21"/>
+    <p:sldId id="367" r:id="rId13"/>
+    <p:sldId id="361" r:id="rId14"/>
+    <p:sldId id="371" r:id="rId15"/>
+    <p:sldId id="362" r:id="rId16"/>
+    <p:sldId id="363" r:id="rId17"/>
+    <p:sldId id="365" r:id="rId18"/>
+    <p:sldId id="373" r:id="rId19"/>
+    <p:sldId id="369" r:id="rId20"/>
+    <p:sldId id="372" r:id="rId21"/>
+    <p:sldId id="370" r:id="rId22"/>
+    <p:sldId id="366" r:id="rId23"/>
+    <p:sldId id="368" r:id="rId24"/>
+    <p:sldId id="265" r:id="rId25"/>
   </p:sldIdLst>
   <p:sldSz cx="12192000" cy="6858000"/>
   <p:notesSz cx="6858000" cy="9144000"/>
@@ -127,6 +131,49 @@
     </a:lvl9pPr>
   </p:defaultTextStyle>
   <p:extLst>
+    <p:ext uri="{521415D9-36F7-43E2-AB2F-B90AF26B5E84}">
+      <p14:sectionLst xmlns:p14="http://schemas.microsoft.com/office/powerpoint/2010/main">
+        <p14:section name="Intro" id="{648F7671-C2C8-479E-80F8-8353857D2FD3}">
+          <p14:sldIdLst>
+            <p14:sldId id="256"/>
+            <p14:sldId id="360"/>
+          </p14:sldIdLst>
+        </p14:section>
+        <p14:section name="Demo VS FizzBuzz" id="{0AAA4355-2067-4205-85F4-D340880B79DC}">
+          <p14:sldIdLst>
+            <p14:sldId id="367"/>
+          </p14:sldIdLst>
+        </p14:section>
+        <p14:section name="Test Double" id="{A72A8FAC-F95B-452D-B29C-C818F108AD6F}">
+          <p14:sldIdLst>
+            <p14:sldId id="361"/>
+            <p14:sldId id="371"/>
+            <p14:sldId id="362"/>
+            <p14:sldId id="363"/>
+            <p14:sldId id="365"/>
+            <p14:sldId id="373"/>
+            <p14:sldId id="369"/>
+            <p14:sldId id="372"/>
+            <p14:sldId id="370"/>
+          </p14:sldIdLst>
+        </p14:section>
+        <p14:section name="Sinon" id="{BE98A4EB-C9F6-490E-8A3A-F1C989434855}">
+          <p14:sldIdLst>
+            <p14:sldId id="366"/>
+          </p14:sldIdLst>
+        </p14:section>
+        <p14:section name="Build server con test" id="{17210CAD-4A0B-47DB-9CF7-82E77D424859}">
+          <p14:sldIdLst>
+            <p14:sldId id="368"/>
+          </p14:sldIdLst>
+        </p14:section>
+        <p14:section name="Fin" id="{2499AC87-2D7C-42B9-9E22-52B4983509DA}">
+          <p14:sldIdLst>
+            <p14:sldId id="265"/>
+          </p14:sldIdLst>
+        </p14:section>
+      </p14:sectionLst>
+    </p:ext>
     <p:ext uri="{EFAFB233-063F-42B5-8137-9DF3F51BA10A}">
       <p15:sldGuideLst xmlns:p15="http://schemas.microsoft.com/office/powerpoint/2012/main"/>
     </p:ext>
@@ -1310,454 +1357,6 @@
       <dsp:cNvGrpSpPr/>
     </dsp:nvGrpSpPr>
     <dsp:grpSpPr/>
-    <dsp:sp modelId="{C19FBA30-382B-44E2-8C1D-137A6F897C28}">
-      <dsp:nvSpPr>
-        <dsp:cNvPr id="0" name=""/>
-        <dsp:cNvSpPr/>
-      </dsp:nvSpPr>
-      <dsp:spPr>
-        <a:xfrm>
-          <a:off x="619648" y="0"/>
-          <a:ext cx="7022680" cy="2448272"/>
-        </a:xfrm>
-        <a:prstGeom prst="rightArrow">
-          <a:avLst/>
-        </a:prstGeom>
-        <a:solidFill>
-          <a:schemeClr val="accent3">
-            <a:tint val="40000"/>
-            <a:hueOff val="0"/>
-            <a:satOff val="0"/>
-            <a:lumOff val="0"/>
-            <a:alphaOff val="0"/>
-          </a:schemeClr>
-        </a:solidFill>
-        <a:ln>
-          <a:noFill/>
-        </a:ln>
-        <a:effectLst/>
-      </dsp:spPr>
-      <dsp:style>
-        <a:lnRef idx="0">
-          <a:scrgbClr r="0" g="0" b="0"/>
-        </a:lnRef>
-        <a:fillRef idx="1">
-          <a:scrgbClr r="0" g="0" b="0"/>
-        </a:fillRef>
-        <a:effectRef idx="2">
-          <a:scrgbClr r="0" g="0" b="0"/>
-        </a:effectRef>
-        <a:fontRef idx="minor"/>
-      </dsp:style>
-    </dsp:sp>
-    <dsp:sp modelId="{3BE67301-9880-4FEC-99F7-88569348EA0D}">
-      <dsp:nvSpPr>
-        <dsp:cNvPr id="0" name=""/>
-        <dsp:cNvSpPr/>
-      </dsp:nvSpPr>
-      <dsp:spPr>
-        <a:xfrm>
-          <a:off x="2823" y="734481"/>
-          <a:ext cx="1834739" cy="979308"/>
-        </a:xfrm>
-        <a:prstGeom prst="roundRect">
-          <a:avLst/>
-        </a:prstGeom>
-        <a:gradFill rotWithShape="0">
-          <a:gsLst>
-            <a:gs pos="0">
-              <a:schemeClr val="accent3">
-                <a:shade val="80000"/>
-                <a:hueOff val="0"/>
-                <a:satOff val="0"/>
-                <a:lumOff val="0"/>
-                <a:alphaOff val="0"/>
-                <a:satMod val="103000"/>
-                <a:lumMod val="102000"/>
-                <a:tint val="94000"/>
-              </a:schemeClr>
-            </a:gs>
-            <a:gs pos="50000">
-              <a:schemeClr val="accent3">
-                <a:shade val="80000"/>
-                <a:hueOff val="0"/>
-                <a:satOff val="0"/>
-                <a:lumOff val="0"/>
-                <a:alphaOff val="0"/>
-                <a:satMod val="110000"/>
-                <a:lumMod val="100000"/>
-                <a:shade val="100000"/>
-              </a:schemeClr>
-            </a:gs>
-            <a:gs pos="100000">
-              <a:schemeClr val="accent3">
-                <a:shade val="80000"/>
-                <a:hueOff val="0"/>
-                <a:satOff val="0"/>
-                <a:lumOff val="0"/>
-                <a:alphaOff val="0"/>
-                <a:lumMod val="99000"/>
-                <a:satMod val="120000"/>
-                <a:shade val="78000"/>
-              </a:schemeClr>
-            </a:gs>
-          </a:gsLst>
-          <a:lin ang="5400000" scaled="0"/>
-        </a:gradFill>
-        <a:ln>
-          <a:noFill/>
-        </a:ln>
-        <a:effectLst/>
-      </dsp:spPr>
-      <dsp:style>
-        <a:lnRef idx="0">
-          <a:scrgbClr r="0" g="0" b="0"/>
-        </a:lnRef>
-        <a:fillRef idx="3">
-          <a:scrgbClr r="0" g="0" b="0"/>
-        </a:fillRef>
-        <a:effectRef idx="2">
-          <a:scrgbClr r="0" g="0" b="0"/>
-        </a:effectRef>
-        <a:fontRef idx="minor">
-          <a:schemeClr val="lt1"/>
-        </a:fontRef>
-      </dsp:style>
-      <dsp:txBody>
-        <a:bodyPr spcFirstLastPara="0" vert="horz" wrap="square" lIns="76200" tIns="76200" rIns="76200" bIns="76200" numCol="1" spcCol="1270" anchor="ctr" anchorCtr="0">
-          <a:noAutofit/>
-        </a:bodyPr>
-        <a:lstStyle/>
-        <a:p>
-          <a:pPr lvl="0" algn="ctr" defTabSz="889000">
-            <a:lnSpc>
-              <a:spcPct val="90000"/>
-            </a:lnSpc>
-            <a:spcBef>
-              <a:spcPct val="0"/>
-            </a:spcBef>
-            <a:spcAft>
-              <a:spcPct val="35000"/>
-            </a:spcAft>
-          </a:pPr>
-          <a:r>
-            <a:rPr lang="es-ES" sz="2000" kern="1200" dirty="0" smtClean="0"/>
-            <a:t>SPRINT 1</a:t>
-          </a:r>
-          <a:endParaRPr lang="es-ES" sz="2000" kern="1200" dirty="0"/>
-        </a:p>
-      </dsp:txBody>
-      <dsp:txXfrm>
-        <a:off x="50629" y="782287"/>
-        <a:ext cx="1739127" cy="883696"/>
-      </dsp:txXfrm>
-    </dsp:sp>
-    <dsp:sp modelId="{41F7C86B-E9DC-4364-8A2B-DD3371CBF3D3}">
-      <dsp:nvSpPr>
-        <dsp:cNvPr id="0" name=""/>
-        <dsp:cNvSpPr/>
-      </dsp:nvSpPr>
-      <dsp:spPr>
-        <a:xfrm>
-          <a:off x="2143353" y="734481"/>
-          <a:ext cx="1834739" cy="979308"/>
-        </a:xfrm>
-        <a:prstGeom prst="roundRect">
-          <a:avLst/>
-        </a:prstGeom>
-        <a:gradFill rotWithShape="0">
-          <a:gsLst>
-            <a:gs pos="0">
-              <a:schemeClr val="accent3">
-                <a:shade val="80000"/>
-                <a:hueOff val="0"/>
-                <a:satOff val="0"/>
-                <a:lumOff val="6364"/>
-                <a:alphaOff val="0"/>
-                <a:satMod val="103000"/>
-                <a:lumMod val="102000"/>
-                <a:tint val="94000"/>
-              </a:schemeClr>
-            </a:gs>
-            <a:gs pos="50000">
-              <a:schemeClr val="accent3">
-                <a:shade val="80000"/>
-                <a:hueOff val="0"/>
-                <a:satOff val="0"/>
-                <a:lumOff val="6364"/>
-                <a:alphaOff val="0"/>
-                <a:satMod val="110000"/>
-                <a:lumMod val="100000"/>
-                <a:shade val="100000"/>
-              </a:schemeClr>
-            </a:gs>
-            <a:gs pos="100000">
-              <a:schemeClr val="accent3">
-                <a:shade val="80000"/>
-                <a:hueOff val="0"/>
-                <a:satOff val="0"/>
-                <a:lumOff val="6364"/>
-                <a:alphaOff val="0"/>
-                <a:lumMod val="99000"/>
-                <a:satMod val="120000"/>
-                <a:shade val="78000"/>
-              </a:schemeClr>
-            </a:gs>
-          </a:gsLst>
-          <a:lin ang="5400000" scaled="0"/>
-        </a:gradFill>
-        <a:ln>
-          <a:noFill/>
-        </a:ln>
-        <a:effectLst/>
-      </dsp:spPr>
-      <dsp:style>
-        <a:lnRef idx="0">
-          <a:scrgbClr r="0" g="0" b="0"/>
-        </a:lnRef>
-        <a:fillRef idx="3">
-          <a:scrgbClr r="0" g="0" b="0"/>
-        </a:fillRef>
-        <a:effectRef idx="2">
-          <a:scrgbClr r="0" g="0" b="0"/>
-        </a:effectRef>
-        <a:fontRef idx="minor">
-          <a:schemeClr val="lt1"/>
-        </a:fontRef>
-      </dsp:style>
-      <dsp:txBody>
-        <a:bodyPr spcFirstLastPara="0" vert="horz" wrap="square" lIns="76200" tIns="76200" rIns="76200" bIns="76200" numCol="1" spcCol="1270" anchor="ctr" anchorCtr="0">
-          <a:noAutofit/>
-        </a:bodyPr>
-        <a:lstStyle/>
-        <a:p>
-          <a:pPr lvl="0" algn="ctr" defTabSz="889000">
-            <a:lnSpc>
-              <a:spcPct val="90000"/>
-            </a:lnSpc>
-            <a:spcBef>
-              <a:spcPct val="0"/>
-            </a:spcBef>
-            <a:spcAft>
-              <a:spcPct val="35000"/>
-            </a:spcAft>
-          </a:pPr>
-          <a:r>
-            <a:rPr lang="es-ES" sz="2000" kern="1200" dirty="0" smtClean="0"/>
-            <a:t>SPRINT 2</a:t>
-          </a:r>
-          <a:endParaRPr lang="es-ES" sz="2000" kern="1200" dirty="0"/>
-        </a:p>
-      </dsp:txBody>
-      <dsp:txXfrm>
-        <a:off x="2191159" y="782287"/>
-        <a:ext cx="1739127" cy="883696"/>
-      </dsp:txXfrm>
-    </dsp:sp>
-    <dsp:sp modelId="{4BAD5466-94E1-47CA-9FAA-DDD3B7595BCC}">
-      <dsp:nvSpPr>
-        <dsp:cNvPr id="0" name=""/>
-        <dsp:cNvSpPr/>
-      </dsp:nvSpPr>
-      <dsp:spPr>
-        <a:xfrm>
-          <a:off x="4283883" y="734481"/>
-          <a:ext cx="1834739" cy="979308"/>
-        </a:xfrm>
-        <a:prstGeom prst="roundRect">
-          <a:avLst/>
-        </a:prstGeom>
-        <a:gradFill rotWithShape="0">
-          <a:gsLst>
-            <a:gs pos="0">
-              <a:schemeClr val="accent3">
-                <a:shade val="80000"/>
-                <a:hueOff val="0"/>
-                <a:satOff val="0"/>
-                <a:lumOff val="12728"/>
-                <a:alphaOff val="0"/>
-                <a:satMod val="103000"/>
-                <a:lumMod val="102000"/>
-                <a:tint val="94000"/>
-              </a:schemeClr>
-            </a:gs>
-            <a:gs pos="50000">
-              <a:schemeClr val="accent3">
-                <a:shade val="80000"/>
-                <a:hueOff val="0"/>
-                <a:satOff val="0"/>
-                <a:lumOff val="12728"/>
-                <a:alphaOff val="0"/>
-                <a:satMod val="110000"/>
-                <a:lumMod val="100000"/>
-                <a:shade val="100000"/>
-              </a:schemeClr>
-            </a:gs>
-            <a:gs pos="100000">
-              <a:schemeClr val="accent3">
-                <a:shade val="80000"/>
-                <a:hueOff val="0"/>
-                <a:satOff val="0"/>
-                <a:lumOff val="12728"/>
-                <a:alphaOff val="0"/>
-                <a:lumMod val="99000"/>
-                <a:satMod val="120000"/>
-                <a:shade val="78000"/>
-              </a:schemeClr>
-            </a:gs>
-          </a:gsLst>
-          <a:lin ang="5400000" scaled="0"/>
-        </a:gradFill>
-        <a:ln>
-          <a:noFill/>
-        </a:ln>
-        <a:effectLst/>
-      </dsp:spPr>
-      <dsp:style>
-        <a:lnRef idx="0">
-          <a:scrgbClr r="0" g="0" b="0"/>
-        </a:lnRef>
-        <a:fillRef idx="3">
-          <a:scrgbClr r="0" g="0" b="0"/>
-        </a:fillRef>
-        <a:effectRef idx="2">
-          <a:scrgbClr r="0" g="0" b="0"/>
-        </a:effectRef>
-        <a:fontRef idx="minor">
-          <a:schemeClr val="lt1"/>
-        </a:fontRef>
-      </dsp:style>
-      <dsp:txBody>
-        <a:bodyPr spcFirstLastPara="0" vert="horz" wrap="square" lIns="76200" tIns="76200" rIns="76200" bIns="76200" numCol="1" spcCol="1270" anchor="ctr" anchorCtr="0">
-          <a:noAutofit/>
-        </a:bodyPr>
-        <a:lstStyle/>
-        <a:p>
-          <a:pPr lvl="0" algn="ctr" defTabSz="889000">
-            <a:lnSpc>
-              <a:spcPct val="90000"/>
-            </a:lnSpc>
-            <a:spcBef>
-              <a:spcPct val="0"/>
-            </a:spcBef>
-            <a:spcAft>
-              <a:spcPct val="35000"/>
-            </a:spcAft>
-          </a:pPr>
-          <a:r>
-            <a:rPr lang="es-ES" sz="2000" kern="1200" dirty="0" smtClean="0"/>
-            <a:t>SPRINT…</a:t>
-          </a:r>
-          <a:endParaRPr lang="es-ES" sz="2000" kern="1200" dirty="0"/>
-        </a:p>
-      </dsp:txBody>
-      <dsp:txXfrm>
-        <a:off x="4331689" y="782287"/>
-        <a:ext cx="1739127" cy="883696"/>
-      </dsp:txXfrm>
-    </dsp:sp>
-    <dsp:sp modelId="{467EE60E-61AA-427F-A830-D12F30BF2A28}">
-      <dsp:nvSpPr>
-        <dsp:cNvPr id="0" name=""/>
-        <dsp:cNvSpPr/>
-      </dsp:nvSpPr>
-      <dsp:spPr>
-        <a:xfrm>
-          <a:off x="6424413" y="734481"/>
-          <a:ext cx="1834739" cy="979308"/>
-        </a:xfrm>
-        <a:prstGeom prst="roundRect">
-          <a:avLst/>
-        </a:prstGeom>
-        <a:gradFill rotWithShape="0">
-          <a:gsLst>
-            <a:gs pos="0">
-              <a:schemeClr val="accent3">
-                <a:shade val="80000"/>
-                <a:hueOff val="0"/>
-                <a:satOff val="0"/>
-                <a:lumOff val="19092"/>
-                <a:alphaOff val="0"/>
-                <a:satMod val="103000"/>
-                <a:lumMod val="102000"/>
-                <a:tint val="94000"/>
-              </a:schemeClr>
-            </a:gs>
-            <a:gs pos="50000">
-              <a:schemeClr val="accent3">
-                <a:shade val="80000"/>
-                <a:hueOff val="0"/>
-                <a:satOff val="0"/>
-                <a:lumOff val="19092"/>
-                <a:alphaOff val="0"/>
-                <a:satMod val="110000"/>
-                <a:lumMod val="100000"/>
-                <a:shade val="100000"/>
-              </a:schemeClr>
-            </a:gs>
-            <a:gs pos="100000">
-              <a:schemeClr val="accent3">
-                <a:shade val="80000"/>
-                <a:hueOff val="0"/>
-                <a:satOff val="0"/>
-                <a:lumOff val="19092"/>
-                <a:alphaOff val="0"/>
-                <a:lumMod val="99000"/>
-                <a:satMod val="120000"/>
-                <a:shade val="78000"/>
-              </a:schemeClr>
-            </a:gs>
-          </a:gsLst>
-          <a:lin ang="5400000" scaled="0"/>
-        </a:gradFill>
-        <a:ln>
-          <a:noFill/>
-        </a:ln>
-        <a:effectLst/>
-      </dsp:spPr>
-      <dsp:style>
-        <a:lnRef idx="0">
-          <a:scrgbClr r="0" g="0" b="0"/>
-        </a:lnRef>
-        <a:fillRef idx="3">
-          <a:scrgbClr r="0" g="0" b="0"/>
-        </a:fillRef>
-        <a:effectRef idx="2">
-          <a:scrgbClr r="0" g="0" b="0"/>
-        </a:effectRef>
-        <a:fontRef idx="minor">
-          <a:schemeClr val="lt1"/>
-        </a:fontRef>
-      </dsp:style>
-      <dsp:txBody>
-        <a:bodyPr spcFirstLastPara="0" vert="horz" wrap="square" lIns="76200" tIns="76200" rIns="76200" bIns="76200" numCol="1" spcCol="1270" anchor="ctr" anchorCtr="0">
-          <a:noAutofit/>
-        </a:bodyPr>
-        <a:lstStyle/>
-        <a:p>
-          <a:pPr lvl="0" algn="ctr" defTabSz="889000">
-            <a:lnSpc>
-              <a:spcPct val="90000"/>
-            </a:lnSpc>
-            <a:spcBef>
-              <a:spcPct val="0"/>
-            </a:spcBef>
-            <a:spcAft>
-              <a:spcPct val="35000"/>
-            </a:spcAft>
-          </a:pPr>
-          <a:r>
-            <a:rPr lang="es-ES" sz="2000" kern="1200" dirty="0" smtClean="0"/>
-            <a:t>SPRINT N</a:t>
-          </a:r>
-          <a:endParaRPr lang="es-ES" sz="2000" kern="1200" dirty="0"/>
-        </a:p>
-      </dsp:txBody>
-      <dsp:txXfrm>
-        <a:off x="6472219" y="782287"/>
-        <a:ext cx="1739127" cy="883696"/>
-      </dsp:txXfrm>
-    </dsp:sp>
   </dsp:spTree>
 </dsp:drawing>
 </file>
@@ -3032,7 +2631,7 @@
           <a:p>
             <a:fld id="{1524C607-EC43-4D45-819C-01ED569A62A9}" type="datetimeFigureOut">
               <a:rPr lang="es-ES_tradnl" smtClean="0"/>
-              <a:t>20/11/2015</a:t>
+              <a:t>23/11/2015</a:t>
             </a:fld>
             <a:endParaRPr lang="es-ES_tradnl"/>
           </a:p>
@@ -3197,7 +2796,7 @@
           <a:p>
             <a:fld id="{26D2F09D-BAE4-494B-8CCF-2A216F98B43B}" type="datetimeFigureOut">
               <a:rPr lang="es-ES_tradnl" smtClean="0"/>
-              <a:t>20/11/2015</a:t>
+              <a:t>23/11/2015</a:t>
             </a:fld>
             <a:endParaRPr lang="es-ES_tradnl"/>
           </a:p>
@@ -6153,7 +5752,7 @@
           <a:p>
             <a:fld id="{CBF0928C-8919-4079-8CB5-882BC2C58241}" type="datetimeFigureOut">
               <a:rPr lang="en-US" smtClean="0"/>
-              <a:t>11/20/2015</a:t>
+              <a:t>23/11/2015</a:t>
             </a:fld>
             <a:endParaRPr lang="en-US"/>
           </a:p>
@@ -15786,12 +15385,12 @@
               <a:t>… y </a:t>
             </a:r>
             <a:r>
-              <a:rPr lang="es-ES" dirty="0" err="1" smtClean="0"/>
-              <a:t>algom</a:t>
-            </a:r>
-            <a:r>
               <a:rPr lang="es-ES" dirty="0" smtClean="0"/>
-              <a:t> más…</a:t>
+              <a:t>algo </a:t>
+            </a:r>
+            <a:r>
+              <a:rPr lang="es-ES" dirty="0" smtClean="0"/>
+              <a:t>más…</a:t>
             </a:r>
             <a:endParaRPr lang="en-US" dirty="0" smtClean="0"/>
           </a:p>
@@ -15888,6 +15487,891 @@
           <a:chExt cx="0" cy="0"/>
         </a:xfrm>
       </p:grpSpPr>
+      <p:pic>
+        <p:nvPicPr>
+          <p:cNvPr id="6" name="Imagen 5"/>
+          <p:cNvPicPr>
+            <a:picLocks noChangeAspect="1"/>
+          </p:cNvPicPr>
+          <p:nvPr/>
+        </p:nvPicPr>
+        <p:blipFill>
+          <a:blip r:embed="rId2"/>
+          <a:stretch>
+            <a:fillRect/>
+          </a:stretch>
+        </p:blipFill>
+        <p:spPr>
+          <a:xfrm>
+            <a:off x="6093514" y="338436"/>
+            <a:ext cx="5800726" cy="5706787"/>
+          </a:xfrm>
+          <a:prstGeom prst="rect">
+            <a:avLst/>
+          </a:prstGeom>
+          <a:solidFill>
+            <a:srgbClr val="FFFFFF">
+              <a:shade val="85000"/>
+            </a:srgbClr>
+          </a:solidFill>
+          <a:ln w="88900" cap="sq">
+            <a:solidFill>
+              <a:srgbClr val="FFFFFF"/>
+            </a:solidFill>
+            <a:miter lim="800000"/>
+          </a:ln>
+          <a:effectLst>
+            <a:outerShdw blurRad="55000" dist="18000" dir="5400000" algn="tl" rotWithShape="0">
+              <a:srgbClr val="000000">
+                <a:alpha val="40000"/>
+              </a:srgbClr>
+            </a:outerShdw>
+          </a:effectLst>
+          <a:scene3d>
+            <a:camera prst="orthographicFront"/>
+            <a:lightRig rig="twoPt" dir="t">
+              <a:rot lat="0" lon="0" rev="7200000"/>
+            </a:lightRig>
+          </a:scene3d>
+          <a:sp3d>
+            <a:bevelT w="25400" h="19050"/>
+            <a:contourClr>
+              <a:srgbClr val="FFFFFF"/>
+            </a:contourClr>
+          </a:sp3d>
+        </p:spPr>
+      </p:pic>
+      <p:sp>
+        <p:nvSpPr>
+          <p:cNvPr id="2" name="Título 1"/>
+          <p:cNvSpPr>
+            <a:spLocks noGrp="1"/>
+          </p:cNvSpPr>
+          <p:nvPr>
+            <p:ph type="title"/>
+          </p:nvPr>
+        </p:nvSpPr>
+        <p:spPr>
+          <a:xfrm>
+            <a:off x="838200" y="25620"/>
+            <a:ext cx="10515600" cy="850263"/>
+          </a:xfrm>
+        </p:spPr>
+        <p:txBody>
+          <a:bodyPr/>
+          <a:lstStyle/>
+          <a:p>
+            <a:r>
+              <a:rPr lang="es-ES" dirty="0" err="1" smtClean="0"/>
+              <a:t>Stubs</a:t>
+            </a:r>
+            <a:endParaRPr lang="es-ES" dirty="0"/>
+          </a:p>
+        </p:txBody>
+      </p:sp>
+      <p:sp>
+        <p:nvSpPr>
+          <p:cNvPr id="3" name="Marcador de contenido 2"/>
+          <p:cNvSpPr>
+            <a:spLocks noGrp="1"/>
+          </p:cNvSpPr>
+          <p:nvPr>
+            <p:ph idx="1"/>
+          </p:nvPr>
+        </p:nvSpPr>
+        <p:spPr>
+          <a:xfrm>
+            <a:off x="838200" y="769546"/>
+            <a:ext cx="10515600" cy="5407418"/>
+          </a:xfrm>
+        </p:spPr>
+        <p:txBody>
+          <a:bodyPr/>
+          <a:lstStyle/>
+          <a:p>
+            <a:r>
+              <a:rPr lang="en-US" sz="2400" dirty="0" err="1" smtClean="0"/>
+              <a:t>Es</a:t>
+            </a:r>
+            <a:r>
+              <a:rPr lang="en-US" sz="2400" dirty="0" smtClean="0"/>
+              <a:t> un spy “</a:t>
+            </a:r>
+            <a:r>
+              <a:rPr lang="en-US" sz="2400" dirty="0" err="1" smtClean="0"/>
+              <a:t>vitaminado</a:t>
+            </a:r>
+            <a:r>
+              <a:rPr lang="en-US" sz="2400" dirty="0" smtClean="0"/>
+              <a:t>”</a:t>
+            </a:r>
+          </a:p>
+          <a:p>
+            <a:pPr marL="0" indent="0">
+              <a:buNone/>
+            </a:pPr>
+            <a:r>
+              <a:rPr lang="en-US" sz="2400" dirty="0" smtClean="0"/>
+              <a:t>    (</a:t>
+            </a:r>
+            <a:r>
+              <a:rPr lang="en-US" sz="2400" dirty="0" err="1" smtClean="0"/>
+              <a:t>sabemos</a:t>
+            </a:r>
+            <a:r>
+              <a:rPr lang="en-US" sz="2400" dirty="0" smtClean="0"/>
+              <a:t> </a:t>
+            </a:r>
+            <a:r>
+              <a:rPr lang="en-US" sz="2400" dirty="0" err="1" smtClean="0"/>
+              <a:t>si</a:t>
+            </a:r>
+            <a:r>
+              <a:rPr lang="en-US" sz="2400" dirty="0" smtClean="0"/>
+              <a:t> se llama)</a:t>
+            </a:r>
+            <a:endParaRPr lang="es-ES" sz="2400" dirty="0" smtClean="0"/>
+          </a:p>
+          <a:p>
+            <a:r>
+              <a:rPr lang="es-ES" sz="2400" dirty="0" smtClean="0"/>
+              <a:t>Tiene las funciones que necesitamos </a:t>
+            </a:r>
+          </a:p>
+          <a:p>
+            <a:pPr marL="0" indent="0">
+              <a:buNone/>
+            </a:pPr>
+            <a:r>
+              <a:rPr lang="es-ES" sz="2400" dirty="0" smtClean="0"/>
+              <a:t>   devolviendo un valor fijo</a:t>
+            </a:r>
+            <a:endParaRPr lang="es-ES" sz="2400" dirty="0"/>
+          </a:p>
+        </p:txBody>
+      </p:sp>
+      <p:pic>
+        <p:nvPicPr>
+          <p:cNvPr id="4" name="Imagen 3"/>
+          <p:cNvPicPr>
+            <a:picLocks noChangeAspect="1"/>
+          </p:cNvPicPr>
+          <p:nvPr/>
+        </p:nvPicPr>
+        <p:blipFill>
+          <a:blip r:embed="rId3"/>
+          <a:stretch>
+            <a:fillRect/>
+          </a:stretch>
+        </p:blipFill>
+        <p:spPr>
+          <a:xfrm>
+            <a:off x="1136581" y="2571784"/>
+            <a:ext cx="4773889" cy="3584044"/>
+          </a:xfrm>
+          <a:prstGeom prst="rect">
+            <a:avLst/>
+          </a:prstGeom>
+          <a:solidFill>
+            <a:srgbClr val="FFFFFF">
+              <a:shade val="85000"/>
+            </a:srgbClr>
+          </a:solidFill>
+          <a:ln w="88900" cap="sq">
+            <a:solidFill>
+              <a:srgbClr val="FFFFFF"/>
+            </a:solidFill>
+            <a:miter lim="800000"/>
+          </a:ln>
+          <a:effectLst>
+            <a:outerShdw blurRad="55000" dist="18000" dir="5400000" algn="tl" rotWithShape="0">
+              <a:srgbClr val="000000">
+                <a:alpha val="40000"/>
+              </a:srgbClr>
+            </a:outerShdw>
+          </a:effectLst>
+          <a:scene3d>
+            <a:camera prst="orthographicFront"/>
+            <a:lightRig rig="twoPt" dir="t">
+              <a:rot lat="0" lon="0" rev="7200000"/>
+            </a:lightRig>
+          </a:scene3d>
+          <a:sp3d>
+            <a:bevelT w="25400" h="19050"/>
+            <a:contourClr>
+              <a:srgbClr val="FFFFFF"/>
+            </a:contourClr>
+          </a:sp3d>
+        </p:spPr>
+      </p:pic>
+      <p:sp>
+        <p:nvSpPr>
+          <p:cNvPr id="5" name="Rectángulo 4"/>
+          <p:cNvSpPr/>
+          <p:nvPr/>
+        </p:nvSpPr>
+        <p:spPr>
+          <a:xfrm>
+            <a:off x="1080789" y="6056245"/>
+            <a:ext cx="5429884" cy="523220"/>
+          </a:xfrm>
+          <a:prstGeom prst="rect">
+            <a:avLst/>
+          </a:prstGeom>
+        </p:spPr>
+        <p:txBody>
+          <a:bodyPr wrap="none">
+            <a:spAutoFit/>
+          </a:bodyPr>
+          <a:lstStyle/>
+          <a:p>
+            <a:r>
+              <a:rPr lang="es-ES" sz="2800" dirty="0"/>
+              <a:t>http://jsfiddle.net/Ericuss/vujvaxx4</a:t>
+            </a:r>
+            <a:r>
+              <a:rPr lang="es-ES" dirty="0"/>
+              <a:t>/</a:t>
+            </a:r>
+          </a:p>
+        </p:txBody>
+      </p:sp>
+    </p:spTree>
+    <p:extLst>
+      <p:ext uri="{BB962C8B-B14F-4D97-AF65-F5344CB8AC3E}">
+        <p14:creationId xmlns:p14="http://schemas.microsoft.com/office/powerpoint/2010/main" val="1177701694"/>
+      </p:ext>
+    </p:extLst>
+  </p:cSld>
+  <p:clrMapOvr>
+    <a:masterClrMapping/>
+  </p:clrMapOvr>
+  <p:timing>
+    <p:tnLst>
+      <p:par>
+        <p:cTn id="1" dur="indefinite" restart="never" nodeType="tmRoot"/>
+      </p:par>
+    </p:tnLst>
+  </p:timing>
+</p:sld>
+</file>
+
+<file path=ppt/slides/slide11.xml><?xml version="1.0" encoding="utf-8"?>
+<p:sld xmlns:a="http://schemas.openxmlformats.org/drawingml/2006/main" xmlns:r="http://schemas.openxmlformats.org/officeDocument/2006/relationships" xmlns:p="http://schemas.openxmlformats.org/presentationml/2006/main">
+  <p:cSld>
+    <p:spTree>
+      <p:nvGrpSpPr>
+        <p:cNvPr id="1" name=""/>
+        <p:cNvGrpSpPr/>
+        <p:nvPr/>
+      </p:nvGrpSpPr>
+      <p:grpSpPr>
+        <a:xfrm>
+          <a:off x="0" y="0"/>
+          <a:ext cx="0" cy="0"/>
+          <a:chOff x="0" y="0"/>
+          <a:chExt cx="0" cy="0"/>
+        </a:xfrm>
+      </p:grpSpPr>
+      <p:sp>
+        <p:nvSpPr>
+          <p:cNvPr id="2" name="Título 1"/>
+          <p:cNvSpPr>
+            <a:spLocks noGrp="1"/>
+          </p:cNvSpPr>
+          <p:nvPr>
+            <p:ph type="title"/>
+          </p:nvPr>
+        </p:nvSpPr>
+        <p:spPr>
+          <a:xfrm>
+            <a:off x="838200" y="25620"/>
+            <a:ext cx="10515600" cy="850263"/>
+          </a:xfrm>
+        </p:spPr>
+        <p:txBody>
+          <a:bodyPr/>
+          <a:lstStyle/>
+          <a:p>
+            <a:r>
+              <a:rPr lang="es-ES" dirty="0" err="1" smtClean="0"/>
+              <a:t>Stubs</a:t>
+            </a:r>
+            <a:r>
+              <a:rPr lang="es-ES" dirty="0" smtClean="0"/>
+              <a:t> con </a:t>
+            </a:r>
+            <a:r>
+              <a:rPr lang="es-ES" dirty="0" err="1" smtClean="0"/>
+              <a:t>sinon</a:t>
+            </a:r>
+            <a:endParaRPr lang="es-ES" dirty="0"/>
+          </a:p>
+        </p:txBody>
+      </p:sp>
+      <p:sp>
+        <p:nvSpPr>
+          <p:cNvPr id="3" name="Marcador de contenido 2"/>
+          <p:cNvSpPr>
+            <a:spLocks noGrp="1"/>
+          </p:cNvSpPr>
+          <p:nvPr>
+            <p:ph idx="1"/>
+          </p:nvPr>
+        </p:nvSpPr>
+        <p:spPr>
+          <a:xfrm>
+            <a:off x="838200" y="769546"/>
+            <a:ext cx="10515600" cy="5407418"/>
+          </a:xfrm>
+        </p:spPr>
+        <p:txBody>
+          <a:bodyPr/>
+          <a:lstStyle/>
+          <a:p>
+            <a:r>
+              <a:rPr lang="en-US" sz="2400" dirty="0" err="1" smtClean="0"/>
+              <a:t>Es</a:t>
+            </a:r>
+            <a:r>
+              <a:rPr lang="en-US" sz="2400" dirty="0" smtClean="0"/>
+              <a:t> un spy “</a:t>
+            </a:r>
+            <a:r>
+              <a:rPr lang="en-US" sz="2400" dirty="0" err="1" smtClean="0"/>
+              <a:t>vitaminado</a:t>
+            </a:r>
+            <a:r>
+              <a:rPr lang="en-US" sz="2400" dirty="0" smtClean="0"/>
+              <a:t>”</a:t>
+            </a:r>
+          </a:p>
+          <a:p>
+            <a:pPr marL="0" indent="0">
+              <a:buNone/>
+            </a:pPr>
+            <a:r>
+              <a:rPr lang="en-US" sz="2400" dirty="0" smtClean="0"/>
+              <a:t>    (</a:t>
+            </a:r>
+            <a:r>
+              <a:rPr lang="en-US" sz="2400" dirty="0" err="1" smtClean="0"/>
+              <a:t>sabemos</a:t>
+            </a:r>
+            <a:r>
+              <a:rPr lang="en-US" sz="2400" dirty="0" smtClean="0"/>
+              <a:t> </a:t>
+            </a:r>
+            <a:r>
+              <a:rPr lang="en-US" sz="2400" dirty="0" err="1" smtClean="0"/>
+              <a:t>si</a:t>
+            </a:r>
+            <a:r>
+              <a:rPr lang="en-US" sz="2400" dirty="0" smtClean="0"/>
+              <a:t> se llama)</a:t>
+            </a:r>
+            <a:endParaRPr lang="es-ES" sz="2400" dirty="0" smtClean="0"/>
+          </a:p>
+          <a:p>
+            <a:r>
+              <a:rPr lang="es-ES" sz="2400" dirty="0" smtClean="0"/>
+              <a:t>Tiene las funciones que necesitamos </a:t>
+            </a:r>
+          </a:p>
+          <a:p>
+            <a:pPr marL="0" indent="0">
+              <a:buNone/>
+            </a:pPr>
+            <a:r>
+              <a:rPr lang="es-ES" sz="2400" dirty="0" smtClean="0"/>
+              <a:t>   devolviendo un valor fijo</a:t>
+            </a:r>
+            <a:endParaRPr lang="es-ES" sz="2400" dirty="0"/>
+          </a:p>
+        </p:txBody>
+      </p:sp>
+      <p:pic>
+        <p:nvPicPr>
+          <p:cNvPr id="4" name="Imagen 3"/>
+          <p:cNvPicPr>
+            <a:picLocks noChangeAspect="1"/>
+          </p:cNvPicPr>
+          <p:nvPr/>
+        </p:nvPicPr>
+        <p:blipFill>
+          <a:blip r:embed="rId2"/>
+          <a:stretch>
+            <a:fillRect/>
+          </a:stretch>
+        </p:blipFill>
+        <p:spPr>
+          <a:xfrm>
+            <a:off x="1136582" y="2571784"/>
+            <a:ext cx="4651660" cy="3492279"/>
+          </a:xfrm>
+          <a:prstGeom prst="rect">
+            <a:avLst/>
+          </a:prstGeom>
+          <a:solidFill>
+            <a:srgbClr val="FFFFFF">
+              <a:shade val="85000"/>
+            </a:srgbClr>
+          </a:solidFill>
+          <a:ln w="88900" cap="sq">
+            <a:solidFill>
+              <a:srgbClr val="FFFFFF"/>
+            </a:solidFill>
+            <a:miter lim="800000"/>
+          </a:ln>
+          <a:effectLst>
+            <a:outerShdw blurRad="55000" dist="18000" dir="5400000" algn="tl" rotWithShape="0">
+              <a:srgbClr val="000000">
+                <a:alpha val="40000"/>
+              </a:srgbClr>
+            </a:outerShdw>
+          </a:effectLst>
+          <a:scene3d>
+            <a:camera prst="orthographicFront"/>
+            <a:lightRig rig="twoPt" dir="t">
+              <a:rot lat="0" lon="0" rev="7200000"/>
+            </a:lightRig>
+          </a:scene3d>
+          <a:sp3d>
+            <a:bevelT w="25400" h="19050"/>
+            <a:contourClr>
+              <a:srgbClr val="FFFFFF"/>
+            </a:contourClr>
+          </a:sp3d>
+        </p:spPr>
+      </p:pic>
+      <p:sp>
+        <p:nvSpPr>
+          <p:cNvPr id="5" name="Rectángulo 4"/>
+          <p:cNvSpPr/>
+          <p:nvPr/>
+        </p:nvSpPr>
+        <p:spPr>
+          <a:xfrm>
+            <a:off x="1080789" y="6056245"/>
+            <a:ext cx="5706049" cy="523220"/>
+          </a:xfrm>
+          <a:prstGeom prst="rect">
+            <a:avLst/>
+          </a:prstGeom>
+        </p:spPr>
+        <p:txBody>
+          <a:bodyPr wrap="none">
+            <a:spAutoFit/>
+          </a:bodyPr>
+          <a:lstStyle/>
+          <a:p>
+            <a:r>
+              <a:rPr lang="es-ES" sz="2800" dirty="0"/>
+              <a:t>http://jsfiddle.net/Ericuss/vmyuqzoe/</a:t>
+            </a:r>
+            <a:endParaRPr lang="es-ES" dirty="0"/>
+          </a:p>
+        </p:txBody>
+      </p:sp>
+      <p:pic>
+        <p:nvPicPr>
+          <p:cNvPr id="7" name="Imagen 6"/>
+          <p:cNvPicPr>
+            <a:picLocks noChangeAspect="1"/>
+          </p:cNvPicPr>
+          <p:nvPr/>
+        </p:nvPicPr>
+        <p:blipFill>
+          <a:blip r:embed="rId3"/>
+          <a:stretch>
+            <a:fillRect/>
+          </a:stretch>
+        </p:blipFill>
+        <p:spPr>
+          <a:xfrm>
+            <a:off x="6208851" y="665825"/>
+            <a:ext cx="5874633" cy="5129962"/>
+          </a:xfrm>
+          <a:prstGeom prst="rect">
+            <a:avLst/>
+          </a:prstGeom>
+          <a:solidFill>
+            <a:srgbClr val="FFFFFF">
+              <a:shade val="85000"/>
+            </a:srgbClr>
+          </a:solidFill>
+          <a:ln w="88900" cap="sq">
+            <a:solidFill>
+              <a:srgbClr val="FFFFFF"/>
+            </a:solidFill>
+            <a:miter lim="800000"/>
+          </a:ln>
+          <a:effectLst>
+            <a:outerShdw blurRad="55000" dist="18000" dir="5400000" algn="tl" rotWithShape="0">
+              <a:srgbClr val="000000">
+                <a:alpha val="40000"/>
+              </a:srgbClr>
+            </a:outerShdw>
+          </a:effectLst>
+          <a:scene3d>
+            <a:camera prst="orthographicFront"/>
+            <a:lightRig rig="twoPt" dir="t">
+              <a:rot lat="0" lon="0" rev="7200000"/>
+            </a:lightRig>
+          </a:scene3d>
+          <a:sp3d>
+            <a:bevelT w="25400" h="19050"/>
+            <a:contourClr>
+              <a:srgbClr val="FFFFFF"/>
+            </a:contourClr>
+          </a:sp3d>
+        </p:spPr>
+      </p:pic>
+    </p:spTree>
+    <p:extLst>
+      <p:ext uri="{BB962C8B-B14F-4D97-AF65-F5344CB8AC3E}">
+        <p14:creationId xmlns:p14="http://schemas.microsoft.com/office/powerpoint/2010/main" val="1232745985"/>
+      </p:ext>
+    </p:extLst>
+  </p:cSld>
+  <p:clrMapOvr>
+    <a:masterClrMapping/>
+  </p:clrMapOvr>
+  <p:timing>
+    <p:tnLst>
+      <p:par>
+        <p:cTn id="1" dur="indefinite" restart="never" nodeType="tmRoot"/>
+      </p:par>
+    </p:tnLst>
+  </p:timing>
+</p:sld>
+</file>
+
+<file path=ppt/slides/slide12.xml><?xml version="1.0" encoding="utf-8"?>
+<p:sld xmlns:a="http://schemas.openxmlformats.org/drawingml/2006/main" xmlns:r="http://schemas.openxmlformats.org/officeDocument/2006/relationships" xmlns:p="http://schemas.openxmlformats.org/presentationml/2006/main">
+  <p:cSld>
+    <p:spTree>
+      <p:nvGrpSpPr>
+        <p:cNvPr id="1" name=""/>
+        <p:cNvGrpSpPr/>
+        <p:nvPr/>
+      </p:nvGrpSpPr>
+      <p:grpSpPr>
+        <a:xfrm>
+          <a:off x="0" y="0"/>
+          <a:ext cx="0" cy="0"/>
+          <a:chOff x="0" y="0"/>
+          <a:chExt cx="0" cy="0"/>
+        </a:xfrm>
+      </p:grpSpPr>
+      <p:sp>
+        <p:nvSpPr>
+          <p:cNvPr id="2" name="Título 1"/>
+          <p:cNvSpPr>
+            <a:spLocks noGrp="1"/>
+          </p:cNvSpPr>
+          <p:nvPr>
+            <p:ph type="title"/>
+          </p:nvPr>
+        </p:nvSpPr>
+        <p:spPr>
+          <a:xfrm>
+            <a:off x="838200" y="134256"/>
+            <a:ext cx="10515600" cy="850263"/>
+          </a:xfrm>
+        </p:spPr>
+        <p:txBody>
+          <a:bodyPr/>
+          <a:lstStyle/>
+          <a:p>
+            <a:r>
+              <a:rPr lang="es-ES" dirty="0" err="1" smtClean="0"/>
+              <a:t>Mock</a:t>
+            </a:r>
+            <a:endParaRPr lang="es-ES" dirty="0"/>
+          </a:p>
+        </p:txBody>
+      </p:sp>
+      <p:sp>
+        <p:nvSpPr>
+          <p:cNvPr id="3" name="Marcador de contenido 2"/>
+          <p:cNvSpPr>
+            <a:spLocks noGrp="1"/>
+          </p:cNvSpPr>
+          <p:nvPr>
+            <p:ph idx="1"/>
+          </p:nvPr>
+        </p:nvSpPr>
+        <p:spPr>
+          <a:xfrm>
+            <a:off x="838200" y="1213164"/>
+            <a:ext cx="5607867" cy="4963800"/>
+          </a:xfrm>
+        </p:spPr>
+        <p:txBody>
+          <a:bodyPr/>
+          <a:lstStyle/>
+          <a:p>
+            <a:r>
+              <a:rPr lang="es-ES" sz="2400" dirty="0" smtClean="0"/>
+              <a:t>Tiene algo de comportamiento</a:t>
+            </a:r>
+          </a:p>
+          <a:p>
+            <a:r>
+              <a:rPr lang="es-ES" sz="2400" dirty="0" smtClean="0"/>
+              <a:t>Sobretodo sirve para sustituir servicios</a:t>
+            </a:r>
+            <a:endParaRPr lang="es-ES" sz="2400" dirty="0"/>
+          </a:p>
+        </p:txBody>
+      </p:sp>
+      <p:sp>
+        <p:nvSpPr>
+          <p:cNvPr id="5" name="Rectángulo 4"/>
+          <p:cNvSpPr/>
+          <p:nvPr/>
+        </p:nvSpPr>
+        <p:spPr>
+          <a:xfrm>
+            <a:off x="1080789" y="6056245"/>
+            <a:ext cx="5626092" cy="523220"/>
+          </a:xfrm>
+          <a:prstGeom prst="rect">
+            <a:avLst/>
+          </a:prstGeom>
+        </p:spPr>
+        <p:txBody>
+          <a:bodyPr wrap="none">
+            <a:spAutoFit/>
+          </a:bodyPr>
+          <a:lstStyle/>
+          <a:p>
+            <a:r>
+              <a:rPr lang="es-ES" sz="2800" dirty="0"/>
+              <a:t>http://jsfiddle.net/Ericuss/d15p5ozL/</a:t>
+            </a:r>
+            <a:endParaRPr lang="es-ES" dirty="0"/>
+          </a:p>
+        </p:txBody>
+      </p:sp>
+      <p:pic>
+        <p:nvPicPr>
+          <p:cNvPr id="7" name="Imagen 6"/>
+          <p:cNvPicPr>
+            <a:picLocks noChangeAspect="1"/>
+          </p:cNvPicPr>
+          <p:nvPr/>
+        </p:nvPicPr>
+        <p:blipFill>
+          <a:blip r:embed="rId2"/>
+          <a:stretch>
+            <a:fillRect/>
+          </a:stretch>
+        </p:blipFill>
+        <p:spPr>
+          <a:xfrm>
+            <a:off x="1080788" y="2710755"/>
+            <a:ext cx="4230067" cy="1906509"/>
+          </a:xfrm>
+          <a:prstGeom prst="rect">
+            <a:avLst/>
+          </a:prstGeom>
+          <a:solidFill>
+            <a:srgbClr val="FFFFFF">
+              <a:shade val="85000"/>
+            </a:srgbClr>
+          </a:solidFill>
+          <a:ln w="88900" cap="sq">
+            <a:solidFill>
+              <a:srgbClr val="FFFFFF"/>
+            </a:solidFill>
+            <a:miter lim="800000"/>
+          </a:ln>
+          <a:effectLst>
+            <a:outerShdw blurRad="55000" dist="18000" dir="5400000" algn="tl" rotWithShape="0">
+              <a:srgbClr val="000000">
+                <a:alpha val="40000"/>
+              </a:srgbClr>
+            </a:outerShdw>
+          </a:effectLst>
+          <a:scene3d>
+            <a:camera prst="orthographicFront"/>
+            <a:lightRig rig="twoPt" dir="t">
+              <a:rot lat="0" lon="0" rev="7200000"/>
+            </a:lightRig>
+          </a:scene3d>
+          <a:sp3d>
+            <a:bevelT w="25400" h="19050"/>
+            <a:contourClr>
+              <a:srgbClr val="FFFFFF"/>
+            </a:contourClr>
+          </a:sp3d>
+        </p:spPr>
+      </p:pic>
+      <p:pic>
+        <p:nvPicPr>
+          <p:cNvPr id="8" name="Imagen 7"/>
+          <p:cNvPicPr>
+            <a:picLocks noChangeAspect="1"/>
+          </p:cNvPicPr>
+          <p:nvPr/>
+        </p:nvPicPr>
+        <p:blipFill>
+          <a:blip r:embed="rId3"/>
+          <a:stretch>
+            <a:fillRect/>
+          </a:stretch>
+        </p:blipFill>
+        <p:spPr>
+          <a:xfrm>
+            <a:off x="7695447" y="70885"/>
+            <a:ext cx="4355468" cy="6751851"/>
+          </a:xfrm>
+          <a:prstGeom prst="rect">
+            <a:avLst/>
+          </a:prstGeom>
+          <a:solidFill>
+            <a:srgbClr val="FFFFFF">
+              <a:shade val="85000"/>
+            </a:srgbClr>
+          </a:solidFill>
+          <a:ln w="88900" cap="sq">
+            <a:solidFill>
+              <a:srgbClr val="FFFFFF"/>
+            </a:solidFill>
+            <a:miter lim="800000"/>
+          </a:ln>
+          <a:effectLst>
+            <a:outerShdw blurRad="55000" dist="18000" dir="5400000" algn="tl" rotWithShape="0">
+              <a:srgbClr val="000000">
+                <a:alpha val="40000"/>
+              </a:srgbClr>
+            </a:outerShdw>
+          </a:effectLst>
+          <a:scene3d>
+            <a:camera prst="orthographicFront"/>
+            <a:lightRig rig="twoPt" dir="t">
+              <a:rot lat="0" lon="0" rev="7200000"/>
+            </a:lightRig>
+          </a:scene3d>
+          <a:sp3d>
+            <a:bevelT w="25400" h="19050"/>
+            <a:contourClr>
+              <a:srgbClr val="FFFFFF"/>
+            </a:contourClr>
+          </a:sp3d>
+        </p:spPr>
+      </p:pic>
+    </p:spTree>
+    <p:extLst>
+      <p:ext uri="{BB962C8B-B14F-4D97-AF65-F5344CB8AC3E}">
+        <p14:creationId xmlns:p14="http://schemas.microsoft.com/office/powerpoint/2010/main" val="4036135093"/>
+      </p:ext>
+    </p:extLst>
+  </p:cSld>
+  <p:clrMapOvr>
+    <a:masterClrMapping/>
+  </p:clrMapOvr>
+  <p:timing>
+    <p:tnLst>
+      <p:par>
+        <p:cTn id="1" dur="indefinite" restart="never" nodeType="tmRoot"/>
+      </p:par>
+    </p:tnLst>
+  </p:timing>
+</p:sld>
+</file>
+
+<file path=ppt/slides/slide13.xml><?xml version="1.0" encoding="utf-8"?>
+<p:sld xmlns:a="http://schemas.openxmlformats.org/drawingml/2006/main" xmlns:r="http://schemas.openxmlformats.org/officeDocument/2006/relationships" xmlns:p="http://schemas.openxmlformats.org/presentationml/2006/main">
+  <p:cSld>
+    <p:spTree>
+      <p:nvGrpSpPr>
+        <p:cNvPr id="1" name=""/>
+        <p:cNvGrpSpPr/>
+        <p:nvPr/>
+      </p:nvGrpSpPr>
+      <p:grpSpPr>
+        <a:xfrm>
+          <a:off x="0" y="0"/>
+          <a:ext cx="0" cy="0"/>
+          <a:chOff x="0" y="0"/>
+          <a:chExt cx="0" cy="0"/>
+        </a:xfrm>
+      </p:grpSpPr>
+      <p:sp>
+        <p:nvSpPr>
+          <p:cNvPr id="2" name="Título 1"/>
+          <p:cNvSpPr>
+            <a:spLocks noGrp="1"/>
+          </p:cNvSpPr>
+          <p:nvPr>
+            <p:ph type="title"/>
+          </p:nvPr>
+        </p:nvSpPr>
+        <p:spPr/>
+        <p:txBody>
+          <a:bodyPr/>
+          <a:lstStyle/>
+          <a:p>
+            <a:r>
+              <a:rPr lang="es-ES" dirty="0" smtClean="0"/>
+              <a:t>Sinon.js (algo parecido!)</a:t>
+            </a:r>
+            <a:endParaRPr lang="es-ES" dirty="0"/>
+          </a:p>
+        </p:txBody>
+      </p:sp>
+      <p:sp>
+        <p:nvSpPr>
+          <p:cNvPr id="4" name="Marcador de contenido 3"/>
+          <p:cNvSpPr>
+            <a:spLocks noGrp="1"/>
+          </p:cNvSpPr>
+          <p:nvPr>
+            <p:ph idx="1"/>
+          </p:nvPr>
+        </p:nvSpPr>
+        <p:spPr/>
+        <p:txBody>
+          <a:bodyPr/>
+          <a:lstStyle/>
+          <a:p>
+            <a:endParaRPr lang="es-ES"/>
+          </a:p>
+        </p:txBody>
+      </p:sp>
+    </p:spTree>
+    <p:extLst>
+      <p:ext uri="{BB962C8B-B14F-4D97-AF65-F5344CB8AC3E}">
+        <p14:creationId xmlns:p14="http://schemas.microsoft.com/office/powerpoint/2010/main" val="2276218811"/>
+      </p:ext>
+    </p:extLst>
+  </p:cSld>
+  <p:clrMapOvr>
+    <a:masterClrMapping/>
+  </p:clrMapOvr>
+</p:sld>
+</file>
+
+<file path=ppt/slides/slide14.xml><?xml version="1.0" encoding="utf-8"?>
+<p:sld xmlns:a="http://schemas.openxmlformats.org/drawingml/2006/main" xmlns:r="http://schemas.openxmlformats.org/officeDocument/2006/relationships" xmlns:p="http://schemas.openxmlformats.org/presentationml/2006/main">
+  <p:cSld>
+    <p:spTree>
+      <p:nvGrpSpPr>
+        <p:cNvPr id="1" name=""/>
+        <p:cNvGrpSpPr/>
+        <p:nvPr/>
+      </p:nvGrpSpPr>
+      <p:grpSpPr>
+        <a:xfrm>
+          <a:off x="0" y="0"/>
+          <a:ext cx="0" cy="0"/>
+          <a:chOff x="0" y="0"/>
+          <a:chExt cx="0" cy="0"/>
+        </a:xfrm>
+      </p:grpSpPr>
       <p:sp>
         <p:nvSpPr>
           <p:cNvPr id="2" name="Título 1"/>
@@ -16068,7 +16552,7 @@
 </p:sld>
 </file>
 
-<file path=ppt/slides/slide11.xml><?xml version="1.0" encoding="utf-8"?>
+<file path=ppt/slides/slide15.xml><?xml version="1.0" encoding="utf-8"?>
 <p:sld xmlns:a="http://schemas.openxmlformats.org/drawingml/2006/main" xmlns:r="http://schemas.openxmlformats.org/officeDocument/2006/relationships" xmlns:p="http://schemas.openxmlformats.org/presentationml/2006/main">
   <p:cSld>
     <p:spTree>
@@ -16192,7 +16676,7 @@
               <a:t> de test </a:t>
             </a:r>
             <a:r>
-              <a:rPr lang="en-US" dirty="0" err="1" smtClean="0"/>
+              <a:rPr lang="es-ES" dirty="0" smtClean="0"/>
               <a:t>basado</a:t>
             </a:r>
             <a:r>
@@ -16210,139 +16694,36 @@
           </a:p>
           <a:p>
             <a:r>
-              <a:rPr lang="en-US" dirty="0" smtClean="0"/>
-              <a:t>Las </a:t>
-            </a:r>
-            <a:r>
-              <a:rPr lang="en-US" dirty="0" err="1" smtClean="0"/>
-              <a:t>diferencias</a:t>
-            </a:r>
-            <a:r>
-              <a:rPr lang="en-US" dirty="0" smtClean="0"/>
-              <a:t> </a:t>
-            </a:r>
-            <a:r>
-              <a:rPr lang="en-US" dirty="0" err="1" smtClean="0"/>
-              <a:t>respecto</a:t>
-            </a:r>
-            <a:r>
-              <a:rPr lang="en-US" dirty="0" smtClean="0"/>
-              <a:t> a TDD son:</a:t>
+              <a:rPr lang="es-ES" dirty="0" smtClean="0"/>
+              <a:t>Las diferencias respecto a TDD son:</a:t>
             </a:r>
           </a:p>
           <a:p>
             <a:pPr lvl="1"/>
             <a:r>
-              <a:rPr lang="en-US" dirty="0" smtClean="0"/>
-              <a:t>Los test son </a:t>
-            </a:r>
-            <a:r>
-              <a:rPr lang="en-US" dirty="0" err="1" smtClean="0"/>
-              <a:t>más</a:t>
-            </a:r>
-            <a:r>
-              <a:rPr lang="en-US" dirty="0" smtClean="0"/>
-              <a:t> </a:t>
-            </a:r>
-            <a:r>
-              <a:rPr lang="en-US" dirty="0" err="1" smtClean="0"/>
-              <a:t>descriptivos</a:t>
-            </a:r>
-            <a:endParaRPr lang="en-US" dirty="0" smtClean="0"/>
+              <a:rPr lang="es-ES" dirty="0" smtClean="0"/>
+              <a:t>Los test son más descriptivos</a:t>
+            </a:r>
           </a:p>
           <a:p>
             <a:pPr lvl="1"/>
             <a:r>
-              <a:rPr lang="en-US" dirty="0" smtClean="0"/>
-              <a:t>Son mas verbose</a:t>
-            </a:r>
+              <a:rPr lang="es-ES" dirty="0" smtClean="0"/>
+              <a:t>Son mas </a:t>
+            </a:r>
+            <a:r>
+              <a:rPr lang="es-ES" dirty="0" err="1" smtClean="0"/>
+              <a:t>verbose</a:t>
+            </a:r>
+            <a:endParaRPr lang="es-ES" dirty="0" smtClean="0"/>
           </a:p>
           <a:p>
             <a:pPr lvl="1"/>
             <a:r>
-              <a:rPr lang="en-US" dirty="0" smtClean="0"/>
-              <a:t>Al </a:t>
-            </a:r>
-            <a:r>
-              <a:rPr lang="en-US" dirty="0" err="1" smtClean="0"/>
-              <a:t>cumplir</a:t>
-            </a:r>
-            <a:r>
-              <a:rPr lang="en-US" dirty="0" smtClean="0"/>
-              <a:t> </a:t>
-            </a:r>
-            <a:r>
-              <a:rPr lang="en-US" dirty="0" err="1" smtClean="0"/>
-              <a:t>los</a:t>
-            </a:r>
-            <a:r>
-              <a:rPr lang="en-US" dirty="0" smtClean="0"/>
-              <a:t> 2 </a:t>
-            </a:r>
-            <a:r>
-              <a:rPr lang="en-US" dirty="0" err="1" smtClean="0"/>
-              <a:t>anteriores</a:t>
-            </a:r>
-            <a:r>
-              <a:rPr lang="en-US" dirty="0" smtClean="0"/>
-              <a:t> </a:t>
-            </a:r>
-            <a:r>
-              <a:rPr lang="en-US" dirty="0" err="1" smtClean="0"/>
-              <a:t>ayuda</a:t>
-            </a:r>
-            <a:r>
-              <a:rPr lang="en-US" dirty="0" smtClean="0"/>
-              <a:t> a que </a:t>
-            </a:r>
-            <a:r>
-              <a:rPr lang="en-US" dirty="0" err="1" smtClean="0"/>
-              <a:t>sirva</a:t>
-            </a:r>
-            <a:r>
-              <a:rPr lang="en-US" dirty="0" smtClean="0"/>
-              <a:t> de </a:t>
-            </a:r>
-            <a:r>
-              <a:rPr lang="en-US" dirty="0" err="1" smtClean="0"/>
-              <a:t>documentacion</a:t>
-            </a:r>
-            <a:r>
-              <a:rPr lang="en-US" dirty="0" smtClean="0"/>
-              <a:t> o que </a:t>
-            </a:r>
-            <a:r>
-              <a:rPr lang="en-US" dirty="0" err="1" smtClean="0"/>
-              <a:t>cualquiera</a:t>
-            </a:r>
-            <a:r>
-              <a:rPr lang="en-US" dirty="0" smtClean="0"/>
-              <a:t> </a:t>
-            </a:r>
-            <a:r>
-              <a:rPr lang="en-US" dirty="0" err="1" smtClean="0"/>
-              <a:t>pueda</a:t>
-            </a:r>
-            <a:r>
-              <a:rPr lang="en-US" dirty="0" smtClean="0"/>
-              <a:t> </a:t>
-            </a:r>
-            <a:r>
-              <a:rPr lang="en-US" dirty="0" err="1" smtClean="0"/>
-              <a:t>ententender</a:t>
-            </a:r>
-            <a:r>
-              <a:rPr lang="en-US" dirty="0" smtClean="0"/>
-              <a:t> la </a:t>
-            </a:r>
-            <a:r>
-              <a:rPr lang="en-US" dirty="0" err="1" smtClean="0"/>
-              <a:t>finalidad</a:t>
-            </a:r>
-            <a:r>
-              <a:rPr lang="en-US" dirty="0" smtClean="0"/>
-              <a:t> del test</a:t>
-            </a:r>
+              <a:rPr lang="es-ES" dirty="0" smtClean="0"/>
+              <a:t>Al cumplir los 2 anteriores ayuda a que sirva de documentación o que cualquiera pueda entender la finalidad del test</a:t>
+            </a:r>
+            <a:endParaRPr lang="es-ES" dirty="0" smtClean="0"/>
           </a:p>
         </p:txBody>
       </p:sp>
@@ -16399,10 +16780,10 @@
           <a:lstStyle/>
           <a:p>
             <a:r>
-              <a:rPr lang="en-US" dirty="0" smtClean="0"/>
-              <a:t>Test Double	</a:t>
-            </a:r>
-            <a:endParaRPr lang="en-US" dirty="0"/>
+              <a:rPr lang="es-ES" dirty="0" smtClean="0"/>
+              <a:t>Cómo utilizarlos en VS</a:t>
+            </a:r>
+            <a:endParaRPr lang="es-ES" dirty="0"/>
           </a:p>
         </p:txBody>
       </p:sp>
@@ -16422,146 +16803,40 @@
           <a:lstStyle/>
           <a:p>
             <a:r>
+              <a:rPr lang="es-ES" dirty="0" err="1" smtClean="0"/>
+              <a:t>Chutzpah</a:t>
+            </a:r>
+            <a:endParaRPr lang="es-ES" dirty="0" smtClean="0"/>
+          </a:p>
+          <a:p>
+            <a:r>
               <a:rPr lang="en-US" dirty="0" smtClean="0"/>
-              <a:t>Lo que se </a:t>
+              <a:t>Demo </a:t>
             </a:r>
             <a:r>
               <a:rPr lang="en-US" dirty="0" err="1" smtClean="0"/>
-              <a:t>utiliza</a:t>
-            </a:r>
-            <a:r>
-              <a:rPr lang="en-US" dirty="0" smtClean="0"/>
-              <a:t> para </a:t>
-            </a:r>
-            <a:r>
-              <a:rPr lang="en-US" dirty="0" err="1" smtClean="0"/>
-              <a:t>sustituir</a:t>
-            </a:r>
-            <a:r>
-              <a:rPr lang="en-US" dirty="0" smtClean="0"/>
-              <a:t> </a:t>
-            </a:r>
-            <a:r>
-              <a:rPr lang="en-US" dirty="0" err="1" smtClean="0"/>
-              <a:t>servicios</a:t>
-            </a:r>
-            <a:r>
-              <a:rPr lang="en-US" dirty="0" smtClean="0"/>
-              <a:t>, collaborators, </a:t>
-            </a:r>
-            <a:r>
-              <a:rPr lang="en-US" dirty="0" err="1" smtClean="0"/>
-              <a:t>obejtos</a:t>
-            </a:r>
-            <a:r>
-              <a:rPr lang="en-US" dirty="0" smtClean="0"/>
-              <a:t> </a:t>
-            </a:r>
-            <a:r>
-              <a:rPr lang="en-US" dirty="0" err="1" smtClean="0"/>
-              <a:t>ajenos</a:t>
-            </a:r>
-            <a:r>
-              <a:rPr lang="en-US" dirty="0" smtClean="0"/>
-              <a:t> o </a:t>
-            </a:r>
-            <a:r>
-              <a:rPr lang="en-US" dirty="0" err="1" smtClean="0"/>
-              <a:t>por</a:t>
-            </a:r>
-            <a:r>
-              <a:rPr lang="en-US" dirty="0" smtClean="0"/>
-              <a:t> </a:t>
-            </a:r>
-            <a:r>
-              <a:rPr lang="en-US" dirty="0" err="1" smtClean="0"/>
-              <a:t>parametros</a:t>
-            </a:r>
-            <a:r>
-              <a:rPr lang="en-US" dirty="0" smtClean="0"/>
-              <a:t>, …</a:t>
-            </a:r>
-          </a:p>
-          <a:p>
-            <a:r>
-              <a:rPr lang="en-US" dirty="0" smtClean="0"/>
-              <a:t>Los </a:t>
-            </a:r>
-            <a:r>
-              <a:rPr lang="en-US" dirty="0" err="1" smtClean="0"/>
-              <a:t>diferentes</a:t>
-            </a:r>
-            <a:r>
-              <a:rPr lang="en-US" dirty="0" smtClean="0"/>
-              <a:t> </a:t>
-            </a:r>
-            <a:r>
-              <a:rPr lang="en-US" dirty="0" err="1" smtClean="0"/>
-              <a:t>tipos</a:t>
-            </a:r>
-            <a:r>
-              <a:rPr lang="en-US" dirty="0" smtClean="0"/>
-              <a:t> son:</a:t>
-            </a:r>
-          </a:p>
-          <a:p>
-            <a:pPr lvl="1"/>
-            <a:r>
-              <a:rPr lang="en-US" dirty="0" smtClean="0"/>
-              <a:t>Dummy</a:t>
-            </a:r>
-          </a:p>
-          <a:p>
-            <a:pPr lvl="1"/>
-            <a:r>
-              <a:rPr lang="en-US" dirty="0" smtClean="0"/>
-              <a:t>Fake</a:t>
-            </a:r>
-          </a:p>
-          <a:p>
-            <a:pPr lvl="1"/>
-            <a:r>
-              <a:rPr lang="en-US" dirty="0" smtClean="0"/>
-              <a:t>Stubs</a:t>
-            </a:r>
-          </a:p>
-          <a:p>
-            <a:pPr lvl="1"/>
-            <a:r>
-              <a:rPr lang="en-US" dirty="0" smtClean="0"/>
-              <a:t>Spies</a:t>
-            </a:r>
-          </a:p>
-          <a:p>
-            <a:pPr lvl="1"/>
-            <a:r>
-              <a:rPr lang="en-US" dirty="0" smtClean="0"/>
-              <a:t>Mocks	</a:t>
-            </a:r>
-          </a:p>
-          <a:p>
-            <a:pPr lvl="1"/>
-            <a:endParaRPr lang="en-US" dirty="0"/>
+              <a:t>FizzBuzz</a:t>
+            </a:r>
+            <a:endParaRPr lang="es-ES" dirty="0" smtClean="0"/>
+          </a:p>
+          <a:p>
+            <a:pPr marL="0" indent="0">
+              <a:buNone/>
+            </a:pPr>
+            <a:endParaRPr lang="es-ES" dirty="0"/>
           </a:p>
         </p:txBody>
       </p:sp>
     </p:spTree>
     <p:extLst>
       <p:ext uri="{BB962C8B-B14F-4D97-AF65-F5344CB8AC3E}">
-        <p14:creationId xmlns:p14="http://schemas.microsoft.com/office/powerpoint/2010/main" val="1274272502"/>
+        <p14:creationId xmlns:p14="http://schemas.microsoft.com/office/powerpoint/2010/main" val="2447786033"/>
       </p:ext>
     </p:extLst>
   </p:cSld>
   <p:clrMapOvr>
     <a:masterClrMapping/>
   </p:clrMapOvr>
-  <p:timing>
-    <p:tnLst>
-      <p:par>
-        <p:cTn id="1" dur="indefinite" restart="never" nodeType="tmRoot"/>
-      </p:par>
-    </p:tnLst>
-  </p:timing>
 </p:sld>
 </file>
 
@@ -16599,7 +16874,7 @@
           <a:p>
             <a:r>
               <a:rPr lang="en-US" dirty="0" smtClean="0"/>
-              <a:t>Dummy</a:t>
+              <a:t>Test Double	</a:t>
             </a:r>
             <a:endParaRPr lang="en-US" dirty="0"/>
           </a:p>
@@ -16617,175 +16892,97 @@
         </p:nvSpPr>
         <p:spPr/>
         <p:txBody>
-          <a:bodyPr>
-            <a:normAutofit lnSpcReduction="10000"/>
-          </a:bodyPr>
+          <a:bodyPr/>
           <a:lstStyle/>
           <a:p>
             <a:r>
-              <a:rPr lang="en-US" dirty="0" err="1" smtClean="0"/>
-              <a:t>Objetos</a:t>
-            </a:r>
-            <a:r>
-              <a:rPr lang="en-US" dirty="0" smtClean="0"/>
-              <a:t> sin </a:t>
-            </a:r>
-            <a:r>
-              <a:rPr lang="en-US" dirty="0" err="1" smtClean="0"/>
-              <a:t>comportamiento</a:t>
-            </a:r>
-            <a:endParaRPr lang="en-US" dirty="0" smtClean="0"/>
-          </a:p>
-          <a:p>
-            <a:r>
-              <a:rPr lang="en-US" dirty="0" smtClean="0"/>
-              <a:t>Se </a:t>
-            </a:r>
-            <a:r>
-              <a:rPr lang="en-US" dirty="0" err="1" smtClean="0"/>
-              <a:t>utiliza</a:t>
-            </a:r>
-            <a:r>
-              <a:rPr lang="en-US" dirty="0" smtClean="0"/>
-              <a:t> para no </a:t>
-            </a:r>
-            <a:r>
-              <a:rPr lang="en-US" dirty="0" err="1" smtClean="0"/>
-              <a:t>pasar</a:t>
-            </a:r>
-            <a:r>
-              <a:rPr lang="en-US" dirty="0" smtClean="0"/>
-              <a:t> un null, </a:t>
-            </a:r>
-            <a:r>
-              <a:rPr lang="en-US" dirty="0" err="1" smtClean="0"/>
-              <a:t>agregar</a:t>
-            </a:r>
-            <a:r>
-              <a:rPr lang="en-US" dirty="0" smtClean="0"/>
-              <a:t> a arrays, etc.</a:t>
-            </a:r>
-          </a:p>
-          <a:p>
-            <a:pPr marL="0" indent="0">
-              <a:buNone/>
-            </a:pPr>
-            <a:endParaRPr lang="en-US" dirty="0"/>
-          </a:p>
-          <a:p>
-            <a:pPr marL="0" indent="0">
-              <a:buNone/>
-            </a:pPr>
-            <a:endParaRPr lang="en-US" dirty="0" smtClean="0"/>
-          </a:p>
-          <a:p>
-            <a:pPr marL="0" indent="0">
-              <a:buNone/>
-            </a:pPr>
-            <a:endParaRPr lang="en-US" dirty="0"/>
-          </a:p>
-          <a:p>
-            <a:pPr marL="0" indent="0">
-              <a:buNone/>
-            </a:pPr>
-            <a:endParaRPr lang="en-US" dirty="0" smtClean="0"/>
-          </a:p>
-          <a:p>
-            <a:pPr marL="0" indent="0">
-              <a:buNone/>
-            </a:pPr>
-            <a:endParaRPr lang="en-US" dirty="0"/>
-          </a:p>
-          <a:p>
-            <a:pPr marL="0" indent="0">
-              <a:buNone/>
-            </a:pPr>
-            <a:endParaRPr lang="en-US" dirty="0" smtClean="0"/>
-          </a:p>
-          <a:p>
-            <a:pPr marL="0" indent="0">
-              <a:buNone/>
-            </a:pPr>
-            <a:r>
-              <a:rPr lang="en-US" dirty="0" smtClean="0"/>
-              <a:t>https://jsfiddle.net/Ericuss/b03zs7kg/</a:t>
-            </a:r>
+              <a:rPr lang="es-ES" dirty="0" smtClean="0"/>
+              <a:t>Lo que se utiliza para sustituir servicios, </a:t>
+            </a:r>
+            <a:r>
+              <a:rPr lang="es-ES" dirty="0" err="1" smtClean="0"/>
+              <a:t>collaborators</a:t>
+            </a:r>
+            <a:r>
+              <a:rPr lang="es-ES" dirty="0" smtClean="0"/>
+              <a:t>, </a:t>
+            </a:r>
+            <a:r>
+              <a:rPr lang="es-ES" dirty="0" err="1" smtClean="0"/>
+              <a:t>obejtos</a:t>
+            </a:r>
+            <a:r>
+              <a:rPr lang="es-ES" dirty="0" smtClean="0"/>
+              <a:t> ajenos o por </a:t>
+            </a:r>
+            <a:r>
+              <a:rPr lang="es-ES" dirty="0" err="1" smtClean="0"/>
+              <a:t>parametros</a:t>
+            </a:r>
+            <a:r>
+              <a:rPr lang="es-ES" dirty="0" smtClean="0"/>
+              <a:t>, …</a:t>
+            </a:r>
+          </a:p>
+          <a:p>
+            <a:r>
+              <a:rPr lang="es-ES" dirty="0" smtClean="0"/>
+              <a:t>Los diferentes tipos son:</a:t>
+            </a:r>
+          </a:p>
+          <a:p>
+            <a:pPr lvl="1"/>
+            <a:r>
+              <a:rPr lang="es-ES" dirty="0" err="1" smtClean="0"/>
+              <a:t>Dummy</a:t>
+            </a:r>
+            <a:endParaRPr lang="es-ES" dirty="0" smtClean="0"/>
+          </a:p>
+          <a:p>
+            <a:pPr lvl="1"/>
+            <a:r>
+              <a:rPr lang="es-ES" dirty="0" err="1" smtClean="0"/>
+              <a:t>Fake</a:t>
+            </a:r>
+            <a:endParaRPr lang="es-ES" dirty="0" smtClean="0"/>
+          </a:p>
+          <a:p>
+            <a:pPr lvl="1"/>
+            <a:r>
+              <a:rPr lang="es-ES" dirty="0" err="1" smtClean="0"/>
+              <a:t>Stubs</a:t>
+            </a:r>
+            <a:endParaRPr lang="es-ES" dirty="0" smtClean="0"/>
+          </a:p>
+          <a:p>
+            <a:pPr lvl="1"/>
+            <a:r>
+              <a:rPr lang="es-ES" dirty="0" err="1" smtClean="0"/>
+              <a:t>Spies</a:t>
+            </a:r>
+            <a:endParaRPr lang="es-ES" dirty="0" smtClean="0"/>
+          </a:p>
+          <a:p>
+            <a:pPr lvl="1"/>
+            <a:r>
+              <a:rPr lang="es-ES" dirty="0" err="1" smtClean="0"/>
+              <a:t>Mocks</a:t>
+            </a:r>
+            <a:r>
+              <a:rPr lang="es-ES" dirty="0" smtClean="0"/>
+              <a:t>	</a:t>
+            </a:r>
+          </a:p>
+          <a:p>
+            <a:pPr lvl="1"/>
             <a:endParaRPr lang="en-US" dirty="0"/>
           </a:p>
         </p:txBody>
       </p:sp>
-      <p:pic>
-        <p:nvPicPr>
-          <p:cNvPr id="5" name="Imagen 4"/>
-          <p:cNvPicPr>
-            <a:picLocks noChangeAspect="1"/>
-          </p:cNvPicPr>
-          <p:nvPr/>
-        </p:nvPicPr>
-        <p:blipFill>
-          <a:blip r:embed="rId2"/>
-          <a:stretch>
-            <a:fillRect/>
-          </a:stretch>
-        </p:blipFill>
-        <p:spPr>
-          <a:xfrm>
-            <a:off x="2909206" y="2810751"/>
-            <a:ext cx="2371725" cy="2628900"/>
-          </a:xfrm>
-          <a:prstGeom prst="rect">
-            <a:avLst/>
-          </a:prstGeom>
-          <a:ln>
-            <a:noFill/>
-          </a:ln>
-          <a:effectLst>
-            <a:outerShdw blurRad="190500" algn="tl" rotWithShape="0">
-              <a:srgbClr val="000000">
-                <a:alpha val="70000"/>
-              </a:srgbClr>
-            </a:outerShdw>
-          </a:effectLst>
-        </p:spPr>
-      </p:pic>
-      <p:pic>
-        <p:nvPicPr>
-          <p:cNvPr id="6" name="Imagen 5"/>
-          <p:cNvPicPr>
-            <a:picLocks noChangeAspect="1"/>
-          </p:cNvPicPr>
-          <p:nvPr/>
-        </p:nvPicPr>
-        <p:blipFill>
-          <a:blip r:embed="rId3"/>
-          <a:stretch>
-            <a:fillRect/>
-          </a:stretch>
-        </p:blipFill>
-        <p:spPr>
-          <a:xfrm>
-            <a:off x="7619516" y="141654"/>
-            <a:ext cx="4133850" cy="5763951"/>
-          </a:xfrm>
-          <a:prstGeom prst="rect">
-            <a:avLst/>
-          </a:prstGeom>
-          <a:ln>
-            <a:noFill/>
-          </a:ln>
-          <a:effectLst>
-            <a:outerShdw blurRad="190500" algn="tl" rotWithShape="0">
-              <a:srgbClr val="000000">
-                <a:alpha val="70000"/>
-              </a:srgbClr>
-            </a:outerShdw>
-          </a:effectLst>
-        </p:spPr>
-      </p:pic>
     </p:spTree>
     <p:extLst>
       <p:ext uri="{BB962C8B-B14F-4D97-AF65-F5344CB8AC3E}">
-        <p14:creationId xmlns:p14="http://schemas.microsoft.com/office/powerpoint/2010/main" val="345031588"/>
+        <p14:creationId xmlns:p14="http://schemas.microsoft.com/office/powerpoint/2010/main" val="1274272502"/>
       </p:ext>
     </p:extLst>
   </p:cSld>
@@ -16831,14 +17028,12 @@
         </p:nvSpPr>
         <p:spPr/>
         <p:txBody>
-          <a:bodyPr>
-            <a:normAutofit/>
-          </a:bodyPr>
+          <a:bodyPr/>
           <a:lstStyle/>
           <a:p>
             <a:r>
-              <a:rPr lang="en-US" dirty="0" smtClean="0"/>
-              <a:t>Fake</a:t>
+              <a:rPr lang="en-US" dirty="0" err="1" smtClean="0"/>
+              <a:t>Sinon</a:t>
             </a:r>
             <a:endParaRPr lang="en-US" dirty="0"/>
           </a:p>
@@ -16860,16 +17055,8 @@
           <a:lstStyle/>
           <a:p>
             <a:r>
-              <a:rPr lang="es-ES" dirty="0" smtClean="0"/>
-              <a:t>Objetos</a:t>
-            </a:r>
-            <a:r>
-              <a:rPr lang="en-US" dirty="0" smtClean="0"/>
-              <a:t> con </a:t>
-            </a:r>
-            <a:r>
               <a:rPr lang="en-US" dirty="0" err="1" smtClean="0"/>
-              <a:t>funcionalidad</a:t>
+              <a:t>Es</a:t>
             </a:r>
             <a:r>
               <a:rPr lang="en-US" dirty="0" smtClean="0"/>
@@ -16877,47 +17064,69 @@
             </a:r>
             <a:r>
               <a:rPr lang="en-US" dirty="0" err="1" smtClean="0"/>
-              <a:t>básica</a:t>
+              <a:t>una</a:t>
+            </a:r>
+            <a:r>
+              <a:rPr lang="en-US" dirty="0" smtClean="0"/>
+              <a:t> </a:t>
+            </a:r>
+            <a:r>
+              <a:rPr lang="en-US" dirty="0" err="1" smtClean="0"/>
+              <a:t>libreria</a:t>
+            </a:r>
+            <a:r>
+              <a:rPr lang="en-US" dirty="0" smtClean="0"/>
+              <a:t> de test doubles</a:t>
+            </a:r>
+          </a:p>
+          <a:p>
+            <a:r>
+              <a:rPr lang="en-US" dirty="0" smtClean="0"/>
+              <a:t>No </a:t>
+            </a:r>
+            <a:r>
+              <a:rPr lang="en-US" dirty="0" err="1" smtClean="0"/>
+              <a:t>es</a:t>
+            </a:r>
+            <a:r>
+              <a:rPr lang="en-US" dirty="0" smtClean="0"/>
+              <a:t> un tes</a:t>
+            </a:r>
+            <a:r>
+              <a:rPr lang="en-US" dirty="0" smtClean="0"/>
+              <a:t>t </a:t>
+            </a:r>
+            <a:r>
+              <a:rPr lang="en-US" dirty="0" smtClean="0"/>
+              <a:t>FW</a:t>
+            </a:r>
+          </a:p>
+          <a:p>
+            <a:pPr lvl="1"/>
+            <a:r>
+              <a:rPr lang="en-US" dirty="0" err="1" smtClean="0"/>
+              <a:t>Ayuda</a:t>
+            </a:r>
+            <a:r>
+              <a:rPr lang="en-US" dirty="0" smtClean="0"/>
+              <a:t> a </a:t>
+            </a:r>
+            <a:r>
+              <a:rPr lang="en-US" dirty="0" err="1" smtClean="0"/>
+              <a:t>otros</a:t>
+            </a:r>
+            <a:r>
+              <a:rPr lang="en-US" dirty="0" smtClean="0"/>
+              <a:t> FW </a:t>
             </a:r>
             <a:endParaRPr lang="en-US" dirty="0" smtClean="0"/>
-          </a:p>
-          <a:p>
-            <a:pPr marL="0" indent="0">
-              <a:buNone/>
-            </a:pPr>
-            <a:endParaRPr lang="en-US" dirty="0"/>
-          </a:p>
-        </p:txBody>
-      </p:sp>
-      <p:sp>
-        <p:nvSpPr>
-          <p:cNvPr id="6" name="Rectángulo 5"/>
-          <p:cNvSpPr/>
-          <p:nvPr/>
-        </p:nvSpPr>
-        <p:spPr>
-          <a:xfrm>
-            <a:off x="838200" y="5372642"/>
-            <a:ext cx="184731" cy="369332"/>
-          </a:xfrm>
-          <a:prstGeom prst="rect">
-            <a:avLst/>
-          </a:prstGeom>
-        </p:spPr>
-        <p:txBody>
-          <a:bodyPr wrap="none">
-            <a:spAutoFit/>
-          </a:bodyPr>
-          <a:lstStyle/>
-          <a:p>
-            <a:endParaRPr lang="en-US" dirty="0"/>
           </a:p>
         </p:txBody>
       </p:sp>
     </p:spTree>
     <p:extLst>
       <p:ext uri="{BB962C8B-B14F-4D97-AF65-F5344CB8AC3E}">
-        <p14:creationId xmlns:p14="http://schemas.microsoft.com/office/powerpoint/2010/main" val="1633976220"/>
+        <p14:creationId xmlns:p14="http://schemas.microsoft.com/office/powerpoint/2010/main" val="890931436"/>
       </p:ext>
     </p:extLst>
   </p:cSld>
@@ -16967,12 +17176,42 @@
         </p:blipFill>
         <p:spPr>
           <a:xfrm>
-            <a:off x="6093514" y="428966"/>
-            <a:ext cx="5800726" cy="5706787"/>
+            <a:off x="7219950" y="150707"/>
+            <a:ext cx="4133850" cy="5763951"/>
           </a:xfrm>
           <a:prstGeom prst="rect">
             <a:avLst/>
           </a:prstGeom>
+          <a:solidFill>
+            <a:srgbClr val="FFFFFF">
+              <a:shade val="85000"/>
+            </a:srgbClr>
+          </a:solidFill>
+          <a:ln w="88900" cap="sq">
+            <a:solidFill>
+              <a:srgbClr val="FFFFFF"/>
+            </a:solidFill>
+            <a:miter lim="800000"/>
+          </a:ln>
+          <a:effectLst>
+            <a:outerShdw blurRad="55000" dist="18000" dir="5400000" algn="tl" rotWithShape="0">
+              <a:srgbClr val="000000">
+                <a:alpha val="40000"/>
+              </a:srgbClr>
+            </a:outerShdw>
+          </a:effectLst>
+          <a:scene3d>
+            <a:camera prst="orthographicFront"/>
+            <a:lightRig rig="twoPt" dir="t">
+              <a:rot lat="0" lon="0" rev="7200000"/>
+            </a:lightRig>
+          </a:scene3d>
+          <a:sp3d>
+            <a:bevelT w="25400" h="19050"/>
+            <a:contourClr>
+              <a:srgbClr val="FFFFFF"/>
+            </a:contourClr>
+          </a:sp3d>
         </p:spPr>
       </p:pic>
       <p:sp>
@@ -16991,10 +17230,10 @@
           <a:lstStyle/>
           <a:p>
             <a:r>
-              <a:rPr lang="es-ES" dirty="0" err="1" smtClean="0"/>
-              <a:t>Stubs</a:t>
-            </a:r>
-            <a:endParaRPr lang="es-ES" dirty="0"/>
+              <a:rPr lang="en-US" dirty="0" smtClean="0"/>
+              <a:t>Dummy</a:t>
+            </a:r>
+            <a:endParaRPr lang="en-US" dirty="0"/>
           </a:p>
         </p:txBody>
       </p:sp>
@@ -17008,108 +17247,119 @@
             <p:ph idx="1"/>
           </p:nvPr>
         </p:nvSpPr>
-        <p:spPr/>
+        <p:spPr>
+          <a:xfrm>
+            <a:off x="838200" y="1825624"/>
+            <a:ext cx="10515600" cy="4747191"/>
+          </a:xfrm>
+        </p:spPr>
         <p:txBody>
-          <a:bodyPr/>
+          <a:bodyPr>
+            <a:normAutofit lnSpcReduction="10000"/>
+          </a:bodyPr>
           <a:lstStyle/>
           <a:p>
             <a:r>
               <a:rPr lang="en-US" dirty="0" err="1" smtClean="0"/>
-              <a:t>Tiene</a:t>
+              <a:t>Objetos</a:t>
             </a:r>
             <a:r>
               <a:rPr lang="en-US" dirty="0" smtClean="0"/>
-              <a:t> las </a:t>
+              <a:t> sin </a:t>
             </a:r>
             <a:r>
               <a:rPr lang="en-US" dirty="0" err="1" smtClean="0"/>
-              <a:t>funciones</a:t>
-            </a:r>
+              <a:t>comportamiento</a:t>
+            </a:r>
+            <a:endParaRPr lang="en-US" dirty="0" smtClean="0"/>
+          </a:p>
+          <a:p>
             <a:r>
               <a:rPr lang="en-US" dirty="0" smtClean="0"/>
-              <a:t> que </a:t>
+              <a:t>Se </a:t>
             </a:r>
             <a:r>
               <a:rPr lang="en-US" dirty="0" err="1" smtClean="0"/>
-              <a:t>necesitamos</a:t>
+              <a:t>utiliza</a:t>
             </a:r>
             <a:r>
               <a:rPr lang="en-US" dirty="0" smtClean="0"/>
-              <a:t> </a:t>
+              <a:t> para no </a:t>
             </a:r>
             <a:r>
               <a:rPr lang="en-US" dirty="0" err="1" smtClean="0"/>
-              <a:t>devolviendo</a:t>
+              <a:t>pasar</a:t>
             </a:r>
             <a:r>
               <a:rPr lang="en-US" dirty="0" smtClean="0"/>
-              <a:t> un valor </a:t>
-            </a:r>
-            <a:r>
-              <a:rPr lang="en-US" dirty="0" err="1" smtClean="0"/>
-              <a:t>fijo</a:t>
+              <a:t> un null, </a:t>
             </a:r>
             <a:endParaRPr lang="en-US" dirty="0" smtClean="0"/>
+          </a:p>
+          <a:p>
+            <a:pPr marL="457200" lvl="1" indent="0">
+              <a:buNone/>
+            </a:pPr>
+            <a:r>
+              <a:rPr lang="en-US" sz="2800" dirty="0" err="1"/>
+              <a:t>agregar</a:t>
+            </a:r>
+            <a:r>
+              <a:rPr lang="en-US" sz="2800" dirty="0"/>
+              <a:t> a arrays, etc.</a:t>
+            </a:r>
           </a:p>
           <a:p>
             <a:pPr marL="0" indent="0">
               <a:buNone/>
             </a:pPr>
-            <a:r>
-              <a:rPr lang="en-US" sz="2400" dirty="0"/>
-              <a:t>(</a:t>
-            </a:r>
-            <a:r>
-              <a:rPr lang="en-US" sz="2400" dirty="0" smtClean="0"/>
-              <a:t>el </a:t>
-            </a:r>
-            <a:r>
-              <a:rPr lang="en-US" sz="2400" dirty="0" err="1" smtClean="0"/>
-              <a:t>resultado</a:t>
-            </a:r>
-            <a:r>
-              <a:rPr lang="en-US" sz="2400" dirty="0" smtClean="0"/>
-              <a:t> no se </a:t>
-            </a:r>
-            <a:r>
-              <a:rPr lang="en-US" sz="2400" dirty="0" err="1" smtClean="0"/>
-              <a:t>ve</a:t>
-            </a:r>
-            <a:r>
-              <a:rPr lang="en-US" sz="2400" dirty="0" smtClean="0"/>
-              <a:t> </a:t>
-            </a:r>
-            <a:r>
-              <a:rPr lang="en-US" sz="2400" dirty="0" err="1" smtClean="0"/>
-              <a:t>alterado</a:t>
-            </a:r>
-            <a:r>
-              <a:rPr lang="en-US" sz="2400" dirty="0" smtClean="0"/>
-              <a:t> </a:t>
-            </a:r>
-            <a:r>
-              <a:rPr lang="en-US" sz="2400" dirty="0" err="1" smtClean="0"/>
-              <a:t>por</a:t>
-            </a:r>
-            <a:r>
-              <a:rPr lang="en-US" sz="2400" dirty="0" smtClean="0"/>
-              <a:t> el </a:t>
-            </a:r>
-            <a:r>
-              <a:rPr lang="en-US" sz="2400" dirty="0" err="1" smtClean="0"/>
-              <a:t>contexto</a:t>
-            </a:r>
-            <a:r>
-              <a:rPr lang="en-US" sz="2400" dirty="0" smtClean="0"/>
-              <a:t>)</a:t>
-            </a:r>
-            <a:endParaRPr lang="es-ES" sz="2400" dirty="0"/>
+            <a:endParaRPr lang="en-US" dirty="0"/>
+          </a:p>
+          <a:p>
+            <a:pPr marL="0" indent="0">
+              <a:buNone/>
+            </a:pPr>
+            <a:endParaRPr lang="en-US" dirty="0" smtClean="0"/>
+          </a:p>
+          <a:p>
+            <a:pPr marL="0" indent="0">
+              <a:buNone/>
+            </a:pPr>
+            <a:endParaRPr lang="en-US" dirty="0"/>
+          </a:p>
+          <a:p>
+            <a:pPr marL="0" indent="0">
+              <a:buNone/>
+            </a:pPr>
+            <a:endParaRPr lang="en-US" dirty="0" smtClean="0"/>
+          </a:p>
+          <a:p>
+            <a:pPr marL="0" indent="0">
+              <a:buNone/>
+            </a:pPr>
+            <a:endParaRPr lang="en-US" dirty="0"/>
+          </a:p>
+          <a:p>
+            <a:pPr marL="0" indent="0">
+              <a:buNone/>
+            </a:pPr>
+            <a:endParaRPr lang="en-US" dirty="0" smtClean="0"/>
+          </a:p>
+          <a:p>
+            <a:pPr marL="0" indent="0">
+              <a:buNone/>
+            </a:pPr>
+            <a:r>
+              <a:rPr lang="en-US" dirty="0" smtClean="0"/>
+              <a:t>https://jsfiddle.net/Ericuss/b03zs7kg/</a:t>
+            </a:r>
+            <a:endParaRPr lang="en-US" dirty="0"/>
           </a:p>
         </p:txBody>
       </p:sp>
       <p:pic>
         <p:nvPicPr>
-          <p:cNvPr id="4" name="Imagen 3"/>
+          <p:cNvPr id="5" name="Imagen 4"/>
           <p:cNvPicPr>
             <a:picLocks noChangeAspect="1"/>
           </p:cNvPicPr>
@@ -17123,50 +17373,48 @@
         </p:blipFill>
         <p:spPr>
           <a:xfrm>
-            <a:off x="1136581" y="2472201"/>
-            <a:ext cx="4773889" cy="3584044"/>
+            <a:off x="2619495" y="3190997"/>
+            <a:ext cx="2371725" cy="2628900"/>
           </a:xfrm>
           <a:prstGeom prst="rect">
             <a:avLst/>
           </a:prstGeom>
+          <a:solidFill>
+            <a:srgbClr val="FFFFFF">
+              <a:shade val="85000"/>
+            </a:srgbClr>
+          </a:solidFill>
+          <a:ln w="88900" cap="sq">
+            <a:solidFill>
+              <a:srgbClr val="FFFFFF"/>
+            </a:solidFill>
+            <a:miter lim="800000"/>
+          </a:ln>
+          <a:effectLst>
+            <a:outerShdw blurRad="55000" dist="18000" dir="5400000" algn="tl" rotWithShape="0">
+              <a:srgbClr val="000000">
+                <a:alpha val="40000"/>
+              </a:srgbClr>
+            </a:outerShdw>
+          </a:effectLst>
+          <a:scene3d>
+            <a:camera prst="orthographicFront"/>
+            <a:lightRig rig="twoPt" dir="t">
+              <a:rot lat="0" lon="0" rev="7200000"/>
+            </a:lightRig>
+          </a:scene3d>
+          <a:sp3d>
+            <a:bevelT w="25400" h="19050"/>
+            <a:contourClr>
+              <a:srgbClr val="FFFFFF"/>
+            </a:contourClr>
+          </a:sp3d>
         </p:spPr>
       </p:pic>
-      <p:sp>
-        <p:nvSpPr>
-          <p:cNvPr id="5" name="Rectángulo 4"/>
-          <p:cNvSpPr/>
-          <p:nvPr/>
-        </p:nvSpPr>
-        <p:spPr>
-          <a:xfrm>
-            <a:off x="1080789" y="6056245"/>
-            <a:ext cx="5429884" cy="523220"/>
-          </a:xfrm>
-          <a:prstGeom prst="rect">
-            <a:avLst/>
-          </a:prstGeom>
-        </p:spPr>
-        <p:txBody>
-          <a:bodyPr wrap="none">
-            <a:spAutoFit/>
-          </a:bodyPr>
-          <a:lstStyle/>
-          <a:p>
-            <a:r>
-              <a:rPr lang="es-ES" sz="2800" dirty="0"/>
-              <a:t>http://jsfiddle.net/Ericuss/vujvaxx4</a:t>
-            </a:r>
-            <a:r>
-              <a:rPr lang="es-ES" dirty="0"/>
-              <a:t>/</a:t>
-            </a:r>
-          </a:p>
-        </p:txBody>
-      </p:sp>
     </p:spTree>
     <p:extLst>
       <p:ext uri="{BB962C8B-B14F-4D97-AF65-F5344CB8AC3E}">
-        <p14:creationId xmlns:p14="http://schemas.microsoft.com/office/powerpoint/2010/main" val="703377696"/>
+        <p14:creationId xmlns:p14="http://schemas.microsoft.com/office/powerpoint/2010/main" val="345031588"/>
       </p:ext>
     </p:extLst>
   </p:cSld>
@@ -17210,16 +17458,23 @@
             <p:ph type="title"/>
           </p:nvPr>
         </p:nvSpPr>
-        <p:spPr/>
+        <p:spPr>
+          <a:xfrm>
+            <a:off x="838200" y="165953"/>
+            <a:ext cx="10515600" cy="1325563"/>
+          </a:xfrm>
+        </p:spPr>
         <p:txBody>
-          <a:bodyPr/>
+          <a:bodyPr>
+            <a:normAutofit/>
+          </a:bodyPr>
           <a:lstStyle/>
           <a:p>
             <a:r>
-              <a:rPr lang="es-ES" dirty="0" err="1" smtClean="0"/>
-              <a:t>Spy</a:t>
-            </a:r>
-            <a:endParaRPr lang="es-ES" dirty="0"/>
+              <a:rPr lang="en-US" dirty="0" smtClean="0"/>
+              <a:t>Fake</a:t>
+            </a:r>
+            <a:endParaRPr lang="en-US" dirty="0"/>
           </a:p>
         </p:txBody>
       </p:sp>
@@ -17233,32 +17488,363 @@
             <p:ph idx="1"/>
           </p:nvPr>
         </p:nvSpPr>
+        <p:spPr>
+          <a:xfrm>
+            <a:off x="838200" y="1158844"/>
+            <a:ext cx="6395519" cy="5018119"/>
+          </a:xfrm>
+        </p:spPr>
+        <p:txBody>
+          <a:bodyPr/>
+          <a:lstStyle/>
+          <a:p>
+            <a:r>
+              <a:rPr lang="es-ES" dirty="0" smtClean="0"/>
+              <a:t>Objetos</a:t>
+            </a:r>
+            <a:r>
+              <a:rPr lang="en-US" dirty="0" smtClean="0"/>
+              <a:t> </a:t>
+            </a:r>
+            <a:r>
+              <a:rPr lang="es-ES" dirty="0" smtClean="0"/>
+              <a:t>con funcionalidad simplificada respecto a la original.</a:t>
+            </a:r>
+          </a:p>
+          <a:p>
+            <a:pPr marL="0" indent="0">
+              <a:buNone/>
+            </a:pPr>
+            <a:endParaRPr lang="es-ES" dirty="0" smtClean="0"/>
+          </a:p>
+          <a:p>
+            <a:pPr marL="0" indent="0">
+              <a:buNone/>
+            </a:pPr>
+            <a:endParaRPr lang="es-ES" dirty="0"/>
+          </a:p>
+          <a:p>
+            <a:pPr marL="0" indent="0">
+              <a:buNone/>
+            </a:pPr>
+            <a:endParaRPr lang="es-ES" dirty="0" smtClean="0"/>
+          </a:p>
+          <a:p>
+            <a:pPr marL="0" indent="0">
+              <a:buNone/>
+            </a:pPr>
+            <a:endParaRPr lang="es-ES" dirty="0"/>
+          </a:p>
+          <a:p>
+            <a:pPr marL="0" indent="0">
+              <a:buNone/>
+            </a:pPr>
+            <a:endParaRPr lang="en-US" dirty="0" smtClean="0"/>
+          </a:p>
+          <a:p>
+            <a:pPr marL="0" indent="0">
+              <a:buNone/>
+            </a:pPr>
+            <a:endParaRPr lang="es-ES" dirty="0" smtClean="0"/>
+          </a:p>
+          <a:p>
+            <a:pPr marL="0" indent="0">
+              <a:buNone/>
+            </a:pPr>
+            <a:endParaRPr lang="es-ES" dirty="0" smtClean="0"/>
+          </a:p>
+          <a:p>
+            <a:pPr marL="0" indent="0">
+              <a:buNone/>
+            </a:pPr>
+            <a:r>
+              <a:rPr lang="es-ES" dirty="0" smtClean="0"/>
+              <a:t>http</a:t>
+            </a:r>
+            <a:r>
+              <a:rPr lang="es-ES" dirty="0"/>
+              <a:t>://jsfiddle.net/Ericuss/sw3f3m41</a:t>
+            </a:r>
+            <a:r>
+              <a:rPr lang="es-ES" dirty="0" smtClean="0"/>
+              <a:t>/</a:t>
+            </a:r>
+            <a:endParaRPr lang="es-ES" dirty="0" smtClean="0"/>
+          </a:p>
+          <a:p>
+            <a:pPr marL="0" indent="0">
+              <a:buNone/>
+            </a:pPr>
+            <a:endParaRPr lang="en-US" dirty="0"/>
+          </a:p>
+        </p:txBody>
+      </p:sp>
+      <p:sp>
+        <p:nvSpPr>
+          <p:cNvPr id="6" name="Rectángulo 5"/>
+          <p:cNvSpPr/>
+          <p:nvPr/>
+        </p:nvSpPr>
+        <p:spPr>
+          <a:xfrm>
+            <a:off x="838200" y="5372642"/>
+            <a:ext cx="184731" cy="369332"/>
+          </a:xfrm>
+          <a:prstGeom prst="rect">
+            <a:avLst/>
+          </a:prstGeom>
+        </p:spPr>
+        <p:txBody>
+          <a:bodyPr wrap="none">
+            <a:spAutoFit/>
+          </a:bodyPr>
+          <a:lstStyle/>
+          <a:p>
+            <a:endParaRPr lang="en-US" dirty="0"/>
+          </a:p>
+        </p:txBody>
+      </p:sp>
+      <p:pic>
+        <p:nvPicPr>
+          <p:cNvPr id="7" name="Imagen 6"/>
+          <p:cNvPicPr>
+            <a:picLocks noChangeAspect="1"/>
+          </p:cNvPicPr>
+          <p:nvPr/>
+        </p:nvPicPr>
+        <p:blipFill>
+          <a:blip r:embed="rId2"/>
+          <a:stretch>
+            <a:fillRect/>
+          </a:stretch>
+        </p:blipFill>
+        <p:spPr>
+          <a:xfrm>
+            <a:off x="1133145" y="1993804"/>
+            <a:ext cx="3547497" cy="3217250"/>
+          </a:xfrm>
+          <a:prstGeom prst="rect">
+            <a:avLst/>
+          </a:prstGeom>
+          <a:solidFill>
+            <a:srgbClr val="FFFFFF">
+              <a:shade val="85000"/>
+            </a:srgbClr>
+          </a:solidFill>
+          <a:ln w="88900" cap="sq">
+            <a:solidFill>
+              <a:srgbClr val="FFFFFF"/>
+            </a:solidFill>
+            <a:miter lim="800000"/>
+          </a:ln>
+          <a:effectLst>
+            <a:outerShdw blurRad="55000" dist="18000" dir="5400000" algn="tl" rotWithShape="0">
+              <a:srgbClr val="000000">
+                <a:alpha val="40000"/>
+              </a:srgbClr>
+            </a:outerShdw>
+          </a:effectLst>
+          <a:scene3d>
+            <a:camera prst="orthographicFront"/>
+            <a:lightRig rig="twoPt" dir="t">
+              <a:rot lat="0" lon="0" rev="7200000"/>
+            </a:lightRig>
+          </a:scene3d>
+          <a:sp3d>
+            <a:bevelT w="25400" h="19050"/>
+            <a:contourClr>
+              <a:srgbClr val="FFFFFF"/>
+            </a:contourClr>
+          </a:sp3d>
+        </p:spPr>
+      </p:pic>
+      <p:pic>
+        <p:nvPicPr>
+          <p:cNvPr id="8" name="Imagen 7"/>
+          <p:cNvPicPr>
+            <a:picLocks noChangeAspect="1"/>
+          </p:cNvPicPr>
+          <p:nvPr/>
+        </p:nvPicPr>
+        <p:blipFill>
+          <a:blip r:embed="rId3"/>
+          <a:stretch>
+            <a:fillRect/>
+          </a:stretch>
+        </p:blipFill>
+        <p:spPr>
+          <a:xfrm>
+            <a:off x="6762421" y="165954"/>
+            <a:ext cx="4591380" cy="5826488"/>
+          </a:xfrm>
+          <a:prstGeom prst="rect">
+            <a:avLst/>
+          </a:prstGeom>
+          <a:solidFill>
+            <a:srgbClr val="FFFFFF">
+              <a:shade val="85000"/>
+            </a:srgbClr>
+          </a:solidFill>
+          <a:ln w="88900" cap="sq">
+            <a:solidFill>
+              <a:srgbClr val="FFFFFF"/>
+            </a:solidFill>
+            <a:miter lim="800000"/>
+          </a:ln>
+          <a:effectLst>
+            <a:outerShdw blurRad="55000" dist="18000" dir="5400000" algn="tl" rotWithShape="0">
+              <a:srgbClr val="000000">
+                <a:alpha val="40000"/>
+              </a:srgbClr>
+            </a:outerShdw>
+          </a:effectLst>
+          <a:scene3d>
+            <a:camera prst="orthographicFront"/>
+            <a:lightRig rig="twoPt" dir="t">
+              <a:rot lat="0" lon="0" rev="7200000"/>
+            </a:lightRig>
+          </a:scene3d>
+          <a:sp3d>
+            <a:bevelT w="25400" h="19050"/>
+            <a:contourClr>
+              <a:srgbClr val="FFFFFF"/>
+            </a:contourClr>
+          </a:sp3d>
+        </p:spPr>
+      </p:pic>
+    </p:spTree>
+    <p:extLst>
+      <p:ext uri="{BB962C8B-B14F-4D97-AF65-F5344CB8AC3E}">
+        <p14:creationId xmlns:p14="http://schemas.microsoft.com/office/powerpoint/2010/main" val="1633976220"/>
+      </p:ext>
+    </p:extLst>
+  </p:cSld>
+  <p:clrMapOvr>
+    <a:masterClrMapping/>
+  </p:clrMapOvr>
+  <p:timing>
+    <p:tnLst>
+      <p:par>
+        <p:cTn id="1" dur="indefinite" restart="never" nodeType="tmRoot"/>
+      </p:par>
+    </p:tnLst>
+  </p:timing>
+</p:sld>
+</file>
+
+<file path=ppt/slides/slide8.xml><?xml version="1.0" encoding="utf-8"?>
+<p:sld xmlns:a="http://schemas.openxmlformats.org/drawingml/2006/main" xmlns:r="http://schemas.openxmlformats.org/officeDocument/2006/relationships" xmlns:p="http://schemas.openxmlformats.org/presentationml/2006/main">
+  <p:cSld>
+    <p:spTree>
+      <p:nvGrpSpPr>
+        <p:cNvPr id="1" name=""/>
+        <p:cNvGrpSpPr/>
+        <p:nvPr/>
+      </p:nvGrpSpPr>
+      <p:grpSpPr>
+        <a:xfrm>
+          <a:off x="0" y="0"/>
+          <a:ext cx="0" cy="0"/>
+          <a:chOff x="0" y="0"/>
+          <a:chExt cx="0" cy="0"/>
+        </a:xfrm>
+      </p:grpSpPr>
+      <p:pic>
+        <p:nvPicPr>
+          <p:cNvPr id="4" name="Imagen 3"/>
+          <p:cNvPicPr>
+            <a:picLocks noChangeAspect="1"/>
+          </p:cNvPicPr>
+          <p:nvPr/>
+        </p:nvPicPr>
+        <p:blipFill>
+          <a:blip r:embed="rId2"/>
+          <a:stretch>
+            <a:fillRect/>
+          </a:stretch>
+        </p:blipFill>
+        <p:spPr>
+          <a:xfrm>
+            <a:off x="6196611" y="878888"/>
+            <a:ext cx="5915487" cy="4350257"/>
+          </a:xfrm>
+          <a:prstGeom prst="rect">
+            <a:avLst/>
+          </a:prstGeom>
+          <a:solidFill>
+            <a:srgbClr val="FFFFFF">
+              <a:shade val="85000"/>
+            </a:srgbClr>
+          </a:solidFill>
+          <a:ln w="88900" cap="sq">
+            <a:solidFill>
+              <a:srgbClr val="FFFFFF"/>
+            </a:solidFill>
+            <a:miter lim="800000"/>
+          </a:ln>
+          <a:effectLst>
+            <a:outerShdw blurRad="55000" dist="18000" dir="5400000" algn="tl" rotWithShape="0">
+              <a:srgbClr val="000000">
+                <a:alpha val="40000"/>
+              </a:srgbClr>
+            </a:outerShdw>
+          </a:effectLst>
+          <a:scene3d>
+            <a:camera prst="orthographicFront"/>
+            <a:lightRig rig="twoPt" dir="t">
+              <a:rot lat="0" lon="0" rev="7200000"/>
+            </a:lightRig>
+          </a:scene3d>
+          <a:sp3d>
+            <a:bevelT w="25400" h="19050"/>
+            <a:contourClr>
+              <a:srgbClr val="FFFFFF"/>
+            </a:contourClr>
+          </a:sp3d>
+        </p:spPr>
+      </p:pic>
+      <p:sp>
+        <p:nvSpPr>
+          <p:cNvPr id="2" name="Título 1"/>
+          <p:cNvSpPr>
+            <a:spLocks noGrp="1"/>
+          </p:cNvSpPr>
+          <p:nvPr>
+            <p:ph type="title"/>
+          </p:nvPr>
+        </p:nvSpPr>
         <p:spPr/>
         <p:txBody>
           <a:bodyPr/>
           <a:lstStyle/>
           <a:p>
             <a:r>
-              <a:rPr lang="en-US" dirty="0" smtClean="0"/>
-              <a:t>Son </a:t>
-            </a:r>
-            <a:r>
-              <a:rPr lang="en-US" dirty="0" err="1" smtClean="0"/>
-              <a:t>como</a:t>
-            </a:r>
-            <a:r>
-              <a:rPr lang="en-US" dirty="0" smtClean="0"/>
-              <a:t> “Stubs </a:t>
-            </a:r>
-            <a:r>
-              <a:rPr lang="en-US" dirty="0" err="1" smtClean="0"/>
-              <a:t>vitaminados</a:t>
-            </a:r>
-            <a:r>
-              <a:rPr lang="en-US" dirty="0" smtClean="0"/>
-              <a:t>”</a:t>
-            </a:r>
-          </a:p>
+              <a:rPr lang="es-ES" dirty="0" err="1" smtClean="0"/>
+              <a:t>Spy</a:t>
+            </a:r>
+            <a:endParaRPr lang="es-ES" dirty="0"/>
+          </a:p>
+        </p:txBody>
+      </p:sp>
+      <p:sp>
+        <p:nvSpPr>
+          <p:cNvPr id="3" name="Marcador de contenido 2"/>
+          <p:cNvSpPr>
+            <a:spLocks noGrp="1"/>
+          </p:cNvSpPr>
+          <p:nvPr>
+            <p:ph idx="1"/>
+          </p:nvPr>
+        </p:nvSpPr>
+        <p:spPr>
+          <a:xfrm>
+            <a:off x="838201" y="1466661"/>
+            <a:ext cx="5518211" cy="4710302"/>
+          </a:xfrm>
+        </p:spPr>
+        <p:txBody>
+          <a:bodyPr/>
+          <a:lstStyle/>
           <a:p>
             <a:r>
               <a:rPr lang="en-US" sz="2400" dirty="0" err="1" smtClean="0"/>
@@ -17306,31 +17892,11 @@
             </a:r>
             <a:r>
               <a:rPr lang="en-US" sz="2400" dirty="0" smtClean="0"/>
-              <a:t>, que </a:t>
-            </a:r>
-            <a:r>
-              <a:rPr lang="en-US" sz="2400" dirty="0" err="1" smtClean="0"/>
-              <a:t>retorne</a:t>
+              <a:t>, </a:t>
             </a:r>
             <a:r>
               <a:rPr lang="en-US" sz="2400" dirty="0" smtClean="0"/>
-              <a:t> </a:t>
-            </a:r>
-            <a:r>
-              <a:rPr lang="en-US" sz="2400" dirty="0" err="1" smtClean="0"/>
-              <a:t>determinados</a:t>
-            </a:r>
-            <a:r>
-              <a:rPr lang="en-US" sz="2400" dirty="0" smtClean="0"/>
-              <a:t> </a:t>
-            </a:r>
-            <a:r>
-              <a:rPr lang="en-US" sz="2400" dirty="0" err="1" smtClean="0"/>
-              <a:t>valores</a:t>
-            </a:r>
-            <a:r>
-              <a:rPr lang="en-US" sz="2400" dirty="0" smtClean="0"/>
-              <a:t>, etc.</a:t>
+              <a:t>etc.</a:t>
             </a:r>
             <a:endParaRPr lang="es-ES" sz="2400" dirty="0"/>
           </a:p>
@@ -17374,30 +17940,6 @@
           <p:nvPr/>
         </p:nvPicPr>
         <p:blipFill>
-          <a:blip r:embed="rId2"/>
-          <a:stretch>
-            <a:fillRect/>
-          </a:stretch>
-        </p:blipFill>
-        <p:spPr>
-          <a:xfrm>
-            <a:off x="971137" y="2766805"/>
-            <a:ext cx="4342986" cy="3401303"/>
-          </a:xfrm>
-          <a:prstGeom prst="rect">
-            <a:avLst/>
-          </a:prstGeom>
-        </p:spPr>
-      </p:pic>
-      <p:pic>
-        <p:nvPicPr>
-          <p:cNvPr id="8" name="Imagen 7"/>
-          <p:cNvPicPr>
-            <a:picLocks noChangeAspect="1"/>
-          </p:cNvPicPr>
-          <p:nvPr/>
-        </p:nvPicPr>
-        <p:blipFill>
           <a:blip r:embed="rId3"/>
           <a:stretch>
             <a:fillRect/>
@@ -17405,90 +17947,48 @@
         </p:blipFill>
         <p:spPr>
           <a:xfrm>
-            <a:off x="7199660" y="130729"/>
-            <a:ext cx="4886322" cy="6776699"/>
+            <a:off x="971137" y="2585741"/>
+            <a:ext cx="4342986" cy="3401303"/>
           </a:xfrm>
           <a:prstGeom prst="rect">
             <a:avLst/>
           </a:prstGeom>
+          <a:solidFill>
+            <a:srgbClr val="FFFFFF">
+              <a:shade val="85000"/>
+            </a:srgbClr>
+          </a:solidFill>
+          <a:ln w="88900" cap="sq">
+            <a:solidFill>
+              <a:srgbClr val="FFFFFF"/>
+            </a:solidFill>
+            <a:miter lim="800000"/>
+          </a:ln>
+          <a:effectLst>
+            <a:outerShdw blurRad="55000" dist="18000" dir="5400000" algn="tl" rotWithShape="0">
+              <a:srgbClr val="000000">
+                <a:alpha val="40000"/>
+              </a:srgbClr>
+            </a:outerShdw>
+          </a:effectLst>
+          <a:scene3d>
+            <a:camera prst="orthographicFront"/>
+            <a:lightRig rig="twoPt" dir="t">
+              <a:rot lat="0" lon="0" rev="7200000"/>
+            </a:lightRig>
+          </a:scene3d>
+          <a:sp3d>
+            <a:bevelT w="25400" h="19050"/>
+            <a:contourClr>
+              <a:srgbClr val="FFFFFF"/>
+            </a:contourClr>
+          </a:sp3d>
         </p:spPr>
       </p:pic>
     </p:spTree>
     <p:extLst>
       <p:ext uri="{BB962C8B-B14F-4D97-AF65-F5344CB8AC3E}">
         <p14:creationId xmlns:p14="http://schemas.microsoft.com/office/powerpoint/2010/main" val="2235843378"/>
-      </p:ext>
-    </p:extLst>
-  </p:cSld>
-  <p:clrMapOvr>
-    <a:masterClrMapping/>
-  </p:clrMapOvr>
-</p:sld>
-</file>
-
-<file path=ppt/slides/slide8.xml><?xml version="1.0" encoding="utf-8"?>
-<p:sld xmlns:a="http://schemas.openxmlformats.org/drawingml/2006/main" xmlns:r="http://schemas.openxmlformats.org/officeDocument/2006/relationships" xmlns:p="http://schemas.openxmlformats.org/presentationml/2006/main">
-  <p:cSld>
-    <p:spTree>
-      <p:nvGrpSpPr>
-        <p:cNvPr id="1" name=""/>
-        <p:cNvGrpSpPr/>
-        <p:nvPr/>
-      </p:nvGrpSpPr>
-      <p:grpSpPr>
-        <a:xfrm>
-          <a:off x="0" y="0"/>
-          <a:ext cx="0" cy="0"/>
-          <a:chOff x="0" y="0"/>
-          <a:chExt cx="0" cy="0"/>
-        </a:xfrm>
-      </p:grpSpPr>
-      <p:sp>
-        <p:nvSpPr>
-          <p:cNvPr id="2" name="Título 1"/>
-          <p:cNvSpPr>
-            <a:spLocks noGrp="1"/>
-          </p:cNvSpPr>
-          <p:nvPr>
-            <p:ph type="title"/>
-          </p:nvPr>
-        </p:nvSpPr>
-        <p:spPr/>
-        <p:txBody>
-          <a:bodyPr/>
-          <a:lstStyle/>
-          <a:p>
-            <a:r>
-              <a:rPr lang="es-ES" dirty="0" smtClean="0"/>
-              <a:t>Sinon.js (algo parecido!)</a:t>
-            </a:r>
-            <a:endParaRPr lang="es-ES" dirty="0"/>
-          </a:p>
-        </p:txBody>
-      </p:sp>
-      <p:sp>
-        <p:nvSpPr>
-          <p:cNvPr id="4" name="Marcador de contenido 3"/>
-          <p:cNvSpPr>
-            <a:spLocks noGrp="1"/>
-          </p:cNvSpPr>
-          <p:nvPr>
-            <p:ph idx="1"/>
-          </p:nvPr>
-        </p:nvSpPr>
-        <p:spPr/>
-        <p:txBody>
-          <a:bodyPr/>
-          <a:lstStyle/>
-          <a:p>
-            <a:endParaRPr lang="es-ES"/>
-          </a:p>
-        </p:txBody>
-      </p:sp>
-    </p:spTree>
-    <p:extLst>
-      <p:ext uri="{BB962C8B-B14F-4D97-AF65-F5344CB8AC3E}">
-        <p14:creationId xmlns:p14="http://schemas.microsoft.com/office/powerpoint/2010/main" val="2276218811"/>
       </p:ext>
     </p:extLst>
   </p:cSld>
@@ -17531,8 +18031,16 @@
           <a:lstStyle/>
           <a:p>
             <a:r>
+              <a:rPr lang="es-ES" dirty="0" err="1" smtClean="0"/>
+              <a:t>Spy</a:t>
+            </a:r>
+            <a:r>
               <a:rPr lang="es-ES" dirty="0" smtClean="0"/>
-              <a:t>Cómo utilizarlos en VS</a:t>
+              <a:t> con </a:t>
+            </a:r>
+            <a:r>
+              <a:rPr lang="es-ES" dirty="0" err="1" smtClean="0"/>
+              <a:t>sinon</a:t>
             </a:r>
             <a:endParaRPr lang="es-ES" dirty="0"/>
           </a:p>
@@ -17548,29 +18056,213 @@
             <p:ph idx="1"/>
           </p:nvPr>
         </p:nvSpPr>
-        <p:spPr/>
+        <p:spPr>
+          <a:xfrm>
+            <a:off x="838201" y="1466661"/>
+            <a:ext cx="5518211" cy="4710302"/>
+          </a:xfrm>
+        </p:spPr>
         <p:txBody>
           <a:bodyPr/>
           <a:lstStyle/>
           <a:p>
             <a:r>
-              <a:rPr lang="es-ES" dirty="0" err="1" smtClean="0"/>
-              <a:t>Chutzpah</a:t>
-            </a:r>
-            <a:endParaRPr lang="es-ES" dirty="0" smtClean="0"/>
-          </a:p>
-          <a:p>
-            <a:pPr marL="0" indent="0">
-              <a:buNone/>
-            </a:pPr>
-            <a:endParaRPr lang="es-ES" dirty="0"/>
+              <a:rPr lang="en-US" sz="2400" dirty="0" err="1" smtClean="0"/>
+              <a:t>Tiene</a:t>
+            </a:r>
+            <a:r>
+              <a:rPr lang="en-US" sz="2400" dirty="0" smtClean="0"/>
+              <a:t> </a:t>
+            </a:r>
+            <a:r>
+              <a:rPr lang="en-US" sz="2400" dirty="0" err="1" smtClean="0"/>
+              <a:t>opciones</a:t>
+            </a:r>
+            <a:r>
+              <a:rPr lang="en-US" sz="2400" dirty="0" smtClean="0"/>
+              <a:t> para saber </a:t>
+            </a:r>
+            <a:r>
+              <a:rPr lang="en-US" sz="2400" dirty="0" err="1" smtClean="0"/>
+              <a:t>si</a:t>
+            </a:r>
+            <a:r>
+              <a:rPr lang="en-US" sz="2400" dirty="0" smtClean="0"/>
+              <a:t> se ha </a:t>
+            </a:r>
+            <a:r>
+              <a:rPr lang="en-US" sz="2400" dirty="0" err="1" smtClean="0"/>
+              <a:t>llamado</a:t>
+            </a:r>
+            <a:r>
+              <a:rPr lang="en-US" sz="2400" dirty="0" smtClean="0"/>
+              <a:t>, </a:t>
+            </a:r>
+            <a:r>
+              <a:rPr lang="en-US" sz="2400" dirty="0" err="1" smtClean="0"/>
+              <a:t>cuantas</a:t>
+            </a:r>
+            <a:r>
+              <a:rPr lang="en-US" sz="2400" dirty="0" smtClean="0"/>
+              <a:t> </a:t>
+            </a:r>
+            <a:r>
+              <a:rPr lang="en-US" sz="2400" dirty="0" err="1" smtClean="0"/>
+              <a:t>veces</a:t>
+            </a:r>
+            <a:r>
+              <a:rPr lang="en-US" sz="2400" dirty="0" smtClean="0"/>
+              <a:t>, </a:t>
+            </a:r>
+            <a:r>
+              <a:rPr lang="en-US" sz="2400" dirty="0" smtClean="0"/>
+              <a:t>etc.</a:t>
+            </a:r>
+            <a:endParaRPr lang="es-ES" sz="2400" dirty="0"/>
           </a:p>
         </p:txBody>
       </p:sp>
+      <p:sp>
+        <p:nvSpPr>
+          <p:cNvPr id="5" name="Rectángulo 4"/>
+          <p:cNvSpPr/>
+          <p:nvPr/>
+        </p:nvSpPr>
+        <p:spPr>
+          <a:xfrm>
+            <a:off x="1080789" y="6056245"/>
+            <a:ext cx="5739263" cy="523220"/>
+          </a:xfrm>
+          <a:prstGeom prst="rect">
+            <a:avLst/>
+          </a:prstGeom>
+        </p:spPr>
+        <p:txBody>
+          <a:bodyPr wrap="none">
+            <a:spAutoFit/>
+          </a:bodyPr>
+          <a:lstStyle/>
+          <a:p>
+            <a:r>
+              <a:rPr lang="es-ES" sz="2800" dirty="0"/>
+              <a:t>http://jsfiddle.net/Ericuss/wyrov8bw/</a:t>
+            </a:r>
+            <a:endParaRPr lang="es-ES" dirty="0"/>
+          </a:p>
+        </p:txBody>
+      </p:sp>
+      <p:pic>
+        <p:nvPicPr>
+          <p:cNvPr id="6" name="Imagen 5"/>
+          <p:cNvPicPr>
+            <a:picLocks noChangeAspect="1"/>
+          </p:cNvPicPr>
+          <p:nvPr/>
+        </p:nvPicPr>
+        <p:blipFill>
+          <a:blip r:embed="rId2"/>
+          <a:stretch>
+            <a:fillRect/>
+          </a:stretch>
+        </p:blipFill>
+        <p:spPr>
+          <a:xfrm>
+            <a:off x="1080789" y="2341670"/>
+            <a:ext cx="4263568" cy="3587468"/>
+          </a:xfrm>
+          <a:prstGeom prst="rect">
+            <a:avLst/>
+          </a:prstGeom>
+          <a:solidFill>
+            <a:srgbClr val="FFFFFF">
+              <a:shade val="85000"/>
+            </a:srgbClr>
+          </a:solidFill>
+          <a:ln w="88900" cap="sq">
+            <a:solidFill>
+              <a:srgbClr val="FFFFFF"/>
+            </a:solidFill>
+            <a:miter lim="800000"/>
+          </a:ln>
+          <a:effectLst>
+            <a:outerShdw blurRad="55000" dist="18000" dir="5400000" algn="tl" rotWithShape="0">
+              <a:srgbClr val="000000">
+                <a:alpha val="40000"/>
+              </a:srgbClr>
+            </a:outerShdw>
+          </a:effectLst>
+          <a:scene3d>
+            <a:camera prst="orthographicFront"/>
+            <a:lightRig rig="twoPt" dir="t">
+              <a:rot lat="0" lon="0" rev="7200000"/>
+            </a:lightRig>
+          </a:scene3d>
+          <a:sp3d>
+            <a:bevelT w="25400" h="19050"/>
+            <a:contourClr>
+              <a:srgbClr val="FFFFFF"/>
+            </a:contourClr>
+          </a:sp3d>
+        </p:spPr>
+      </p:pic>
+      <p:pic>
+        <p:nvPicPr>
+          <p:cNvPr id="8" name="Imagen 7"/>
+          <p:cNvPicPr>
+            <a:picLocks noChangeAspect="1"/>
+          </p:cNvPicPr>
+          <p:nvPr/>
+        </p:nvPicPr>
+        <p:blipFill>
+          <a:blip r:embed="rId3"/>
+          <a:stretch>
+            <a:fillRect/>
+          </a:stretch>
+        </p:blipFill>
+        <p:spPr>
+          <a:xfrm>
+            <a:off x="5885711" y="1392270"/>
+            <a:ext cx="6187920" cy="3747129"/>
+          </a:xfrm>
+          <a:prstGeom prst="rect">
+            <a:avLst/>
+          </a:prstGeom>
+          <a:solidFill>
+            <a:srgbClr val="FFFFFF">
+              <a:shade val="85000"/>
+            </a:srgbClr>
+          </a:solidFill>
+          <a:ln w="88900" cap="sq">
+            <a:solidFill>
+              <a:srgbClr val="FFFFFF"/>
+            </a:solidFill>
+            <a:miter lim="800000"/>
+          </a:ln>
+          <a:effectLst>
+            <a:outerShdw blurRad="55000" dist="18000" dir="5400000" algn="tl" rotWithShape="0">
+              <a:srgbClr val="000000">
+                <a:alpha val="40000"/>
+              </a:srgbClr>
+            </a:outerShdw>
+          </a:effectLst>
+          <a:scene3d>
+            <a:camera prst="orthographicFront"/>
+            <a:lightRig rig="twoPt" dir="t">
+              <a:rot lat="0" lon="0" rev="7200000"/>
+            </a:lightRig>
+          </a:scene3d>
+          <a:sp3d>
+            <a:bevelT w="25400" h="19050"/>
+            <a:contourClr>
+              <a:srgbClr val="FFFFFF"/>
+            </a:contourClr>
+          </a:sp3d>
+        </p:spPr>
+      </p:pic>
     </p:spTree>
     <p:extLst>
       <p:ext uri="{BB962C8B-B14F-4D97-AF65-F5344CB8AC3E}">
-        <p14:creationId xmlns:p14="http://schemas.microsoft.com/office/powerpoint/2010/main" val="2447786033"/>
+        <p14:creationId xmlns:p14="http://schemas.microsoft.com/office/powerpoint/2010/main" val="550602629"/>
       </p:ext>
     </p:extLst>
   </p:cSld>
@@ -19930,12 +20622,9 @@
 </file>
 
 <file path=customXml/item1.xml><?xml version="1.0" encoding="utf-8"?>
-<?mso-contentType ?>
-<FormTemplates xmlns="http://schemas.microsoft.com/sharepoint/v3/contenttype/forms">
-  <Display>DocumentLibraryForm</Display>
-  <Edit>DocumentLibraryForm</Edit>
-  <New>DocumentLibraryForm</New>
-</FormTemplates>
+<p:properties xmlns:p="http://schemas.microsoft.com/office/2006/metadata/properties" xmlns:xsi="http://www.w3.org/2001/XMLSchema-instance" xmlns:pc="http://schemas.microsoft.com/office/infopath/2007/PartnerControls">
+  <documentManagement/>
+</p:properties>
 </file>
 
 <file path=customXml/item2.xml><?xml version="1.0" encoding="utf-8"?>
@@ -20087,15 +20776,26 @@
 </file>
 
 <file path=customXml/item3.xml><?xml version="1.0" encoding="utf-8"?>
-<p:properties xmlns:p="http://schemas.microsoft.com/office/2006/metadata/properties" xmlns:xsi="http://www.w3.org/2001/XMLSchema-instance" xmlns:pc="http://schemas.microsoft.com/office/infopath/2007/PartnerControls">
-  <documentManagement/>
-</p:properties>
+<?mso-contentType ?>
+<FormTemplates xmlns="http://schemas.microsoft.com/sharepoint/v3/contenttype/forms">
+  <Display>DocumentLibraryForm</Display>
+  <Edit>DocumentLibraryForm</Edit>
+  <New>DocumentLibraryForm</New>
+</FormTemplates>
 </file>
 
 <file path=customXml/itemProps1.xml><?xml version="1.0" encoding="utf-8"?>
-<ds:datastoreItem xmlns:ds="http://schemas.openxmlformats.org/officeDocument/2006/customXml" ds:itemID="{5313EA09-C0DC-4015-ABE0-A5612D75F864}">
+<ds:datastoreItem xmlns:ds="http://schemas.openxmlformats.org/officeDocument/2006/customXml" ds:itemID="{6C60FA3A-4249-4D6E-A9A8-3B7219DF275B}">
   <ds:schemaRefs>
-    <ds:schemaRef ds:uri="http://schemas.microsoft.com/sharepoint/v3/contenttype/forms"/>
+    <ds:schemaRef ds:uri="http://purl.org/dc/elements/1.1/"/>
+    <ds:schemaRef ds:uri="6b8ba544-61ba-4092-92c0-bbfbc426b2b9"/>
+    <ds:schemaRef ds:uri="http://schemas.openxmlformats.org/package/2006/metadata/core-properties"/>
+    <ds:schemaRef ds:uri="http://schemas.microsoft.com/office/2006/documentManagement/types"/>
+    <ds:schemaRef ds:uri="http://purl.org/dc/terms/"/>
+    <ds:schemaRef ds:uri="http://schemas.microsoft.com/office/2006/metadata/properties"/>
+    <ds:schemaRef ds:uri="http://schemas.microsoft.com/office/infopath/2007/PartnerControls"/>
+    <ds:schemaRef ds:uri="http://www.w3.org/XML/1998/namespace"/>
+    <ds:schemaRef ds:uri="http://purl.org/dc/dcmitype/"/>
   </ds:schemaRefs>
 </ds:datastoreItem>
 </file>
@@ -20119,17 +20819,9 @@
 </file>
 
 <file path=customXml/itemProps3.xml><?xml version="1.0" encoding="utf-8"?>
-<ds:datastoreItem xmlns:ds="http://schemas.openxmlformats.org/officeDocument/2006/customXml" ds:itemID="{6C60FA3A-4249-4D6E-A9A8-3B7219DF275B}">
+<ds:datastoreItem xmlns:ds="http://schemas.openxmlformats.org/officeDocument/2006/customXml" ds:itemID="{5313EA09-C0DC-4015-ABE0-A5612D75F864}">
   <ds:schemaRefs>
-    <ds:schemaRef ds:uri="http://purl.org/dc/elements/1.1/"/>
-    <ds:schemaRef ds:uri="6b8ba544-61ba-4092-92c0-bbfbc426b2b9"/>
-    <ds:schemaRef ds:uri="http://schemas.openxmlformats.org/package/2006/metadata/core-properties"/>
-    <ds:schemaRef ds:uri="http://schemas.microsoft.com/office/2006/documentManagement/types"/>
-    <ds:schemaRef ds:uri="http://purl.org/dc/terms/"/>
-    <ds:schemaRef ds:uri="http://schemas.microsoft.com/office/2006/metadata/properties"/>
-    <ds:schemaRef ds:uri="http://schemas.microsoft.com/office/infopath/2007/PartnerControls"/>
-    <ds:schemaRef ds:uri="http://www.w3.org/XML/1998/namespace"/>
-    <ds:schemaRef ds:uri="http://purl.org/dc/dcmitype/"/>
+    <ds:schemaRef ds:uri="http://schemas.microsoft.com/sharepoint/v3/contenttype/forms"/>
   </ds:schemaRefs>
 </ds:datastoreItem>
 </file>
</xml_diff>

<commit_message>
fiz ppt fake slide
</commit_message>
<xml_diff>
--- a/Documentacion/jasmine.pptx
+++ b/Documentacion/jasmine.pptx
@@ -18791,7 +18791,7 @@
       </p:sp>
       <p:pic>
         <p:nvPicPr>
-          <p:cNvPr id="7" name="Imagen 6"/>
+          <p:cNvPr id="5" name="Imagen 4"/>
           <p:cNvPicPr>
             <a:picLocks noChangeAspect="1"/>
           </p:cNvPicPr>
@@ -18805,8 +18805,8 @@
         </p:blipFill>
         <p:spPr>
           <a:xfrm>
-            <a:off x="1133145" y="2070004"/>
-            <a:ext cx="3547497" cy="3217250"/>
+            <a:off x="1022931" y="2142066"/>
+            <a:ext cx="4409681" cy="3620580"/>
           </a:xfrm>
           <a:prstGeom prst="rect">
             <a:avLst/>
@@ -18845,7 +18845,7 @@
       </p:pic>
       <p:pic>
         <p:nvPicPr>
-          <p:cNvPr id="8" name="Imagen 7"/>
+          <p:cNvPr id="9" name="Imagen 8"/>
           <p:cNvPicPr>
             <a:picLocks noChangeAspect="1"/>
           </p:cNvPicPr>
@@ -18859,8 +18859,8 @@
         </p:blipFill>
         <p:spPr>
           <a:xfrm>
-            <a:off x="7256197" y="165954"/>
-            <a:ext cx="4591380" cy="5826488"/>
+            <a:off x="7128747" y="202529"/>
+            <a:ext cx="4932801" cy="6417727"/>
           </a:xfrm>
           <a:prstGeom prst="rect">
             <a:avLst/>
@@ -21725,21 +21725,6 @@
 </file>
 
 <file path=customXml/item1.xml><?xml version="1.0" encoding="utf-8"?>
-<?mso-contentType ?>
-<FormTemplates xmlns="http://schemas.microsoft.com/sharepoint/v3/contenttype/forms">
-  <Display>DocumentLibraryForm</Display>
-  <Edit>DocumentLibraryForm</Edit>
-  <New>DocumentLibraryForm</New>
-</FormTemplates>
-</file>
-
-<file path=customXml/item2.xml><?xml version="1.0" encoding="utf-8"?>
-<p:properties xmlns:p="http://schemas.microsoft.com/office/2006/metadata/properties" xmlns:xsi="http://www.w3.org/2001/XMLSchema-instance" xmlns:pc="http://schemas.microsoft.com/office/infopath/2007/PartnerControls">
-  <documentManagement/>
-</p:properties>
-</file>
-
-<file path=customXml/item3.xml><?xml version="1.0" encoding="utf-8"?>
 <ct:contentTypeSchema xmlns:ct="http://schemas.microsoft.com/office/2006/metadata/contentType" xmlns:ma="http://schemas.microsoft.com/office/2006/metadata/properties/metaAttributes" ct:_="" ma:_="" ma:contentTypeName="Documento" ma:contentTypeID="0x010100EE07C93EE308FD45A1DF8EECCD132EA8" ma:contentTypeVersion="2" ma:contentTypeDescription="Crear nuevo documento." ma:contentTypeScope="" ma:versionID="293d65d43021d27c03e1543e16c1116d">
   <xsd:schema xmlns:xsd="http://www.w3.org/2001/XMLSchema" xmlns:xs="http://www.w3.org/2001/XMLSchema" xmlns:p="http://schemas.microsoft.com/office/2006/metadata/properties" xmlns:ns2="6b8ba544-61ba-4092-92c0-bbfbc426b2b9" targetNamespace="http://schemas.microsoft.com/office/2006/metadata/properties" ma:root="true" ma:fieldsID="5d4d1204a385af403260f4b70f2d4cdc" ns2:_="">
     <xsd:import namespace="6b8ba544-61ba-4092-92c0-bbfbc426b2b9"/>
@@ -21887,10 +21872,35 @@
 </ct:contentTypeSchema>
 </file>
 
+<file path=customXml/item2.xml><?xml version="1.0" encoding="utf-8"?>
+<p:properties xmlns:p="http://schemas.microsoft.com/office/2006/metadata/properties" xmlns:xsi="http://www.w3.org/2001/XMLSchema-instance" xmlns:pc="http://schemas.microsoft.com/office/infopath/2007/PartnerControls">
+  <documentManagement/>
+</p:properties>
+</file>
+
+<file path=customXml/item3.xml><?xml version="1.0" encoding="utf-8"?>
+<?mso-contentType ?>
+<FormTemplates xmlns="http://schemas.microsoft.com/sharepoint/v3/contenttype/forms">
+  <Display>DocumentLibraryForm</Display>
+  <Edit>DocumentLibraryForm</Edit>
+  <New>DocumentLibraryForm</New>
+</FormTemplates>
+</file>
+
 <file path=customXml/itemProps1.xml><?xml version="1.0" encoding="utf-8"?>
-<ds:datastoreItem xmlns:ds="http://schemas.openxmlformats.org/officeDocument/2006/customXml" ds:itemID="{5313EA09-C0DC-4015-ABE0-A5612D75F864}">
+<ds:datastoreItem xmlns:ds="http://schemas.openxmlformats.org/officeDocument/2006/customXml" ds:itemID="{3EAE86C5-427D-4329-8AAA-7B500850AC96}">
   <ds:schemaRefs>
-    <ds:schemaRef ds:uri="http://schemas.microsoft.com/sharepoint/v3/contenttype/forms"/>
+    <ds:schemaRef ds:uri="http://schemas.microsoft.com/office/2006/metadata/contentType"/>
+    <ds:schemaRef ds:uri="http://schemas.microsoft.com/office/2006/metadata/properties/metaAttributes"/>
+    <ds:schemaRef ds:uri="http://www.w3.org/2001/XMLSchema"/>
+    <ds:schemaRef ds:uri="http://schemas.microsoft.com/office/2006/metadata/properties"/>
+    <ds:schemaRef ds:uri="6b8ba544-61ba-4092-92c0-bbfbc426b2b9"/>
+    <ds:schemaRef ds:uri="http://schemas.microsoft.com/office/2006/documentManagement/types"/>
+    <ds:schemaRef ds:uri="http://schemas.microsoft.com/office/infopath/2007/PartnerControls"/>
+    <ds:schemaRef ds:uri="http://schemas.openxmlformats.org/package/2006/metadata/core-properties"/>
+    <ds:schemaRef ds:uri="http://purl.org/dc/elements/1.1/"/>
+    <ds:schemaRef ds:uri="http://purl.org/dc/terms/"/>
+    <ds:schemaRef ds:uri="http://schemas.microsoft.com/internal/obd"/>
   </ds:schemaRefs>
 </ds:datastoreItem>
 </file>
@@ -21912,19 +21922,9 @@
 </file>
 
 <file path=customXml/itemProps3.xml><?xml version="1.0" encoding="utf-8"?>
-<ds:datastoreItem xmlns:ds="http://schemas.openxmlformats.org/officeDocument/2006/customXml" ds:itemID="{3EAE86C5-427D-4329-8AAA-7B500850AC96}">
+<ds:datastoreItem xmlns:ds="http://schemas.openxmlformats.org/officeDocument/2006/customXml" ds:itemID="{5313EA09-C0DC-4015-ABE0-A5612D75F864}">
   <ds:schemaRefs>
-    <ds:schemaRef ds:uri="http://schemas.microsoft.com/office/2006/metadata/contentType"/>
-    <ds:schemaRef ds:uri="http://schemas.microsoft.com/office/2006/metadata/properties/metaAttributes"/>
-    <ds:schemaRef ds:uri="http://www.w3.org/2001/XMLSchema"/>
-    <ds:schemaRef ds:uri="http://schemas.microsoft.com/office/2006/metadata/properties"/>
-    <ds:schemaRef ds:uri="6b8ba544-61ba-4092-92c0-bbfbc426b2b9"/>
-    <ds:schemaRef ds:uri="http://schemas.microsoft.com/office/2006/documentManagement/types"/>
-    <ds:schemaRef ds:uri="http://schemas.microsoft.com/office/infopath/2007/PartnerControls"/>
-    <ds:schemaRef ds:uri="http://schemas.openxmlformats.org/package/2006/metadata/core-properties"/>
-    <ds:schemaRef ds:uri="http://purl.org/dc/elements/1.1/"/>
-    <ds:schemaRef ds:uri="http://purl.org/dc/terms/"/>
-    <ds:schemaRef ds:uri="http://schemas.microsoft.com/internal/obd"/>
+    <ds:schemaRef ds:uri="http://schemas.microsoft.com/sharepoint/v3/contenttype/forms"/>
   </ds:schemaRefs>
 </ds:datastoreItem>
 </file>
</xml_diff>

<commit_message>
modificaciones en la charla
</commit_message>
<xml_diff>
--- a/Documentacion/jasmine.pptx
+++ b/Documentacion/jasmine.pptx
@@ -17657,7 +17657,27 @@
             <a:pPr lvl="1"/>
             <a:r>
               <a:rPr lang="es-ES" dirty="0" smtClean="0"/>
-              <a:t>Son más </a:t>
+              <a:t>Las verificaciones (</a:t>
+            </a:r>
+            <a:r>
+              <a:rPr lang="es-ES" dirty="0" err="1" smtClean="0"/>
+              <a:t>expects</a:t>
+            </a:r>
+            <a:r>
+              <a:rPr lang="es-ES" dirty="0" smtClean="0"/>
+              <a:t>, </a:t>
+            </a:r>
+            <a:r>
+              <a:rPr lang="es-ES" dirty="0" err="1" smtClean="0"/>
+              <a:t>asserts</a:t>
+            </a:r>
+            <a:r>
+              <a:rPr lang="es-ES" dirty="0" smtClean="0"/>
+              <a:t>, …) son </a:t>
+            </a:r>
+            <a:r>
+              <a:rPr lang="es-ES" dirty="0" smtClean="0"/>
+              <a:t>más </a:t>
             </a:r>
             <a:r>
               <a:rPr lang="es-ES" dirty="0" err="1" smtClean="0"/>
@@ -18252,7 +18272,19 @@
           <a:p>
             <a:r>
               <a:rPr lang="es-ES" dirty="0" smtClean="0"/>
-              <a:t>Lo que se utiliza para sustituir servicios, colaboradores, objetos ajenos o por parámetros, …</a:t>
+              <a:t>Lo que se utiliza para sustituir servicios, colaboradores, objetos ajenos </a:t>
+            </a:r>
+            <a:r>
+              <a:rPr lang="es-ES" smtClean="0"/>
+              <a:t>o </a:t>
+            </a:r>
+            <a:r>
+              <a:rPr lang="es-ES" smtClean="0"/>
+              <a:t>parámetros</a:t>
+            </a:r>
+            <a:r>
+              <a:rPr lang="es-ES" dirty="0" smtClean="0"/>
+              <a:t>, …</a:t>
             </a:r>
           </a:p>
           <a:p>
@@ -18695,13 +18727,7 @@
               <a:rPr lang="en-US" dirty="0" smtClean="0">
                 <a:hlinkClick r:id="rId2"/>
               </a:rPr>
-              <a:t>https://jsfiddle.net/Ericuss/b03zs7kg</a:t>
-            </a:r>
-            <a:r>
-              <a:rPr lang="en-US" dirty="0" smtClean="0">
-                <a:hlinkClick r:id="rId2"/>
-              </a:rPr>
-              <a:t>/</a:t>
+              <a:t>https://jsfiddle.net/Ericuss/b03zs7kg/</a:t>
             </a:r>
             <a:endParaRPr lang="en-US" dirty="0" smtClean="0"/>
           </a:p>
@@ -21990,21 +22016,6 @@
 </file>
 
 <file path=customXml/item1.xml><?xml version="1.0" encoding="utf-8"?>
-<?mso-contentType ?>
-<FormTemplates xmlns="http://schemas.microsoft.com/sharepoint/v3/contenttype/forms">
-  <Display>DocumentLibraryForm</Display>
-  <Edit>DocumentLibraryForm</Edit>
-  <New>DocumentLibraryForm</New>
-</FormTemplates>
-</file>
-
-<file path=customXml/item2.xml><?xml version="1.0" encoding="utf-8"?>
-<p:properties xmlns:p="http://schemas.microsoft.com/office/2006/metadata/properties" xmlns:xsi="http://www.w3.org/2001/XMLSchema-instance" xmlns:pc="http://schemas.microsoft.com/office/infopath/2007/PartnerControls">
-  <documentManagement/>
-</p:properties>
-</file>
-
-<file path=customXml/item3.xml><?xml version="1.0" encoding="utf-8"?>
 <ct:contentTypeSchema xmlns:ct="http://schemas.microsoft.com/office/2006/metadata/contentType" xmlns:ma="http://schemas.microsoft.com/office/2006/metadata/properties/metaAttributes" ct:_="" ma:_="" ma:contentTypeName="Documento" ma:contentTypeID="0x010100EE07C93EE308FD45A1DF8EECCD132EA8" ma:contentTypeVersion="2" ma:contentTypeDescription="Crear nuevo documento." ma:contentTypeScope="" ma:versionID="293d65d43021d27c03e1543e16c1116d">
   <xsd:schema xmlns:xsd="http://www.w3.org/2001/XMLSchema" xmlns:xs="http://www.w3.org/2001/XMLSchema" xmlns:p="http://schemas.microsoft.com/office/2006/metadata/properties" xmlns:ns2="6b8ba544-61ba-4092-92c0-bbfbc426b2b9" targetNamespace="http://schemas.microsoft.com/office/2006/metadata/properties" ma:root="true" ma:fieldsID="5d4d1204a385af403260f4b70f2d4cdc" ns2:_="">
     <xsd:import namespace="6b8ba544-61ba-4092-92c0-bbfbc426b2b9"/>
@@ -22152,10 +22163,35 @@
 </ct:contentTypeSchema>
 </file>
 
+<file path=customXml/item2.xml><?xml version="1.0" encoding="utf-8"?>
+<p:properties xmlns:p="http://schemas.microsoft.com/office/2006/metadata/properties" xmlns:xsi="http://www.w3.org/2001/XMLSchema-instance" xmlns:pc="http://schemas.microsoft.com/office/infopath/2007/PartnerControls">
+  <documentManagement/>
+</p:properties>
+</file>
+
+<file path=customXml/item3.xml><?xml version="1.0" encoding="utf-8"?>
+<?mso-contentType ?>
+<FormTemplates xmlns="http://schemas.microsoft.com/sharepoint/v3/contenttype/forms">
+  <Display>DocumentLibraryForm</Display>
+  <Edit>DocumentLibraryForm</Edit>
+  <New>DocumentLibraryForm</New>
+</FormTemplates>
+</file>
+
 <file path=customXml/itemProps1.xml><?xml version="1.0" encoding="utf-8"?>
-<ds:datastoreItem xmlns:ds="http://schemas.openxmlformats.org/officeDocument/2006/customXml" ds:itemID="{5313EA09-C0DC-4015-ABE0-A5612D75F864}">
+<ds:datastoreItem xmlns:ds="http://schemas.openxmlformats.org/officeDocument/2006/customXml" ds:itemID="{3EAE86C5-427D-4329-8AAA-7B500850AC96}">
   <ds:schemaRefs>
-    <ds:schemaRef ds:uri="http://schemas.microsoft.com/sharepoint/v3/contenttype/forms"/>
+    <ds:schemaRef ds:uri="http://schemas.microsoft.com/office/2006/metadata/contentType"/>
+    <ds:schemaRef ds:uri="http://schemas.microsoft.com/office/2006/metadata/properties/metaAttributes"/>
+    <ds:schemaRef ds:uri="http://www.w3.org/2001/XMLSchema"/>
+    <ds:schemaRef ds:uri="http://schemas.microsoft.com/office/2006/metadata/properties"/>
+    <ds:schemaRef ds:uri="6b8ba544-61ba-4092-92c0-bbfbc426b2b9"/>
+    <ds:schemaRef ds:uri="http://schemas.microsoft.com/office/2006/documentManagement/types"/>
+    <ds:schemaRef ds:uri="http://schemas.microsoft.com/office/infopath/2007/PartnerControls"/>
+    <ds:schemaRef ds:uri="http://schemas.openxmlformats.org/package/2006/metadata/core-properties"/>
+    <ds:schemaRef ds:uri="http://purl.org/dc/elements/1.1/"/>
+    <ds:schemaRef ds:uri="http://purl.org/dc/terms/"/>
+    <ds:schemaRef ds:uri="http://schemas.microsoft.com/internal/obd"/>
   </ds:schemaRefs>
 </ds:datastoreItem>
 </file>
@@ -22177,19 +22213,9 @@
 </file>
 
 <file path=customXml/itemProps3.xml><?xml version="1.0" encoding="utf-8"?>
-<ds:datastoreItem xmlns:ds="http://schemas.openxmlformats.org/officeDocument/2006/customXml" ds:itemID="{3EAE86C5-427D-4329-8AAA-7B500850AC96}">
+<ds:datastoreItem xmlns:ds="http://schemas.openxmlformats.org/officeDocument/2006/customXml" ds:itemID="{5313EA09-C0DC-4015-ABE0-A5612D75F864}">
   <ds:schemaRefs>
-    <ds:schemaRef ds:uri="http://schemas.microsoft.com/office/2006/metadata/contentType"/>
-    <ds:schemaRef ds:uri="http://schemas.microsoft.com/office/2006/metadata/properties/metaAttributes"/>
-    <ds:schemaRef ds:uri="http://www.w3.org/2001/XMLSchema"/>
-    <ds:schemaRef ds:uri="http://schemas.microsoft.com/office/2006/metadata/properties"/>
-    <ds:schemaRef ds:uri="6b8ba544-61ba-4092-92c0-bbfbc426b2b9"/>
-    <ds:schemaRef ds:uri="http://schemas.microsoft.com/office/2006/documentManagement/types"/>
-    <ds:schemaRef ds:uri="http://schemas.microsoft.com/office/infopath/2007/PartnerControls"/>
-    <ds:schemaRef ds:uri="http://schemas.openxmlformats.org/package/2006/metadata/core-properties"/>
-    <ds:schemaRef ds:uri="http://purl.org/dc/elements/1.1/"/>
-    <ds:schemaRef ds:uri="http://purl.org/dc/terms/"/>
-    <ds:schemaRef ds:uri="http://schemas.microsoft.com/internal/obd"/>
+    <ds:schemaRef ds:uri="http://schemas.microsoft.com/sharepoint/v3/contenttype/forms"/>
   </ds:schemaRefs>
 </ds:datastoreItem>
 </file>
</xml_diff>